<commit_message>
Added notebook and final slide changes
</commit_message>
<xml_diff>
--- a/clean_code_talkV3.pptx
+++ b/clean_code_talkV3.pptx
@@ -5,11 +5,11 @@
     <p:sldMasterId id="2147483660" r:id="rId1"/>
   </p:sldMasterIdLst>
   <p:notesMasterIdLst>
-    <p:notesMasterId r:id="rId53"/>
+    <p:notesMasterId r:id="rId54"/>
   </p:notesMasterIdLst>
   <p:sldIdLst>
     <p:sldId id="256" r:id="rId2"/>
-    <p:sldId id="279" r:id="rId3"/>
+    <p:sldId id="353" r:id="rId3"/>
     <p:sldId id="310" r:id="rId4"/>
     <p:sldId id="352" r:id="rId5"/>
     <p:sldId id="283" r:id="rId6"/>
@@ -48,17 +48,18 @@
     <p:sldId id="329" r:id="rId39"/>
     <p:sldId id="337" r:id="rId40"/>
     <p:sldId id="330" r:id="rId41"/>
-    <p:sldId id="332" r:id="rId42"/>
-    <p:sldId id="351" r:id="rId43"/>
-    <p:sldId id="344" r:id="rId44"/>
-    <p:sldId id="345" r:id="rId45"/>
-    <p:sldId id="346" r:id="rId46"/>
-    <p:sldId id="348" r:id="rId47"/>
-    <p:sldId id="347" r:id="rId48"/>
-    <p:sldId id="349" r:id="rId49"/>
-    <p:sldId id="350" r:id="rId50"/>
-    <p:sldId id="343" r:id="rId51"/>
-    <p:sldId id="285" r:id="rId52"/>
+    <p:sldId id="354" r:id="rId42"/>
+    <p:sldId id="332" r:id="rId43"/>
+    <p:sldId id="351" r:id="rId44"/>
+    <p:sldId id="344" r:id="rId45"/>
+    <p:sldId id="345" r:id="rId46"/>
+    <p:sldId id="346" r:id="rId47"/>
+    <p:sldId id="348" r:id="rId48"/>
+    <p:sldId id="347" r:id="rId49"/>
+    <p:sldId id="349" r:id="rId50"/>
+    <p:sldId id="350" r:id="rId51"/>
+    <p:sldId id="343" r:id="rId52"/>
+    <p:sldId id="285" r:id="rId53"/>
   </p:sldIdLst>
   <p:sldSz cx="9144000" cy="6858000" type="screen4x3"/>
   <p:notesSz cx="6858000" cy="9144000"/>
@@ -161,6 +162,9 @@
     <p:ext uri="{EFAFB233-063F-42B5-8137-9DF3F51BA10A}">
       <p15:sldGuideLst xmlns:p15="http://schemas.microsoft.com/office/powerpoint/2012/main"/>
     </p:ext>
+    <p:ext uri="{2D200454-40CA-4A62-9FC3-DE9A4176ACB9}">
+      <p15:notesGuideLst xmlns:p15="http://schemas.microsoft.com/office/powerpoint/2012/main"/>
+    </p:ext>
   </p:extLst>
 </p:presentation>
 </file>
@@ -247,7 +251,7 @@
           <a:p>
             <a:fld id="{F896E547-A51B-CD41-A6F3-56A992FABC57}" type="datetimeFigureOut">
               <a:rPr lang="en-US" smtClean="0"/>
-              <a:t>5/29/19</a:t>
+              <a:t>6/5/19</a:t>
             </a:fld>
             <a:endParaRPr lang="en-US"/>
           </a:p>
@@ -560,16 +564,13 @@
           <a:p>
             <a:r>
               <a:rPr lang="en-US" dirty="0"/>
-              <a:t>Over the last few years, I have been doing some research on software engineering techniques that will help our students.  In this talk I will highlight a few; namely picking good names, using small functions that do one thing, using unit tests to ensure our code is correct, and refactoring our code to make it more modular and readable.</a:t>
+              <a:t>(click) The hero of our drama, Doug Ervison, budding data science major with a penchant to messy code .</a:t>
             </a:r>
-          </a:p>
-          <a:p>
-            <a:endParaRPr lang="en-US" dirty="0"/>
           </a:p>
           <a:p>
             <a:r>
               <a:rPr lang="en-US" dirty="0"/>
-              <a:t>But more importantly, this talk tells the story of Doug.</a:t>
+              <a:t>(click) The villain in this drama is the mean Dr. Iverson, who always complains about Doug’s code.  He sometimes even says it stinks.</a:t>
             </a:r>
           </a:p>
         </p:txBody>
@@ -591,7 +592,7 @@
           <a:p>
             <a:fld id="{175B13A7-3F55-9746-A0A5-C673C1C6AB21}" type="slidenum">
               <a:rPr lang="en-US" smtClean="0"/>
-              <a:t>2</a:t>
+              <a:t>3</a:t>
             </a:fld>
             <a:endParaRPr lang="en-US"/>
           </a:p>
@@ -600,7 +601,7 @@
     </p:spTree>
     <p:extLst>
       <p:ext uri="{BB962C8B-B14F-4D97-AF65-F5344CB8AC3E}">
-        <p14:creationId xmlns:p14="http://schemas.microsoft.com/office/powerpoint/2010/main" val="2921981046"/>
+        <p14:creationId xmlns:p14="http://schemas.microsoft.com/office/powerpoint/2010/main" val="3473931624"/>
       </p:ext>
     </p:extLst>
   </p:cSld>
@@ -656,25 +657,19 @@
           <a:p>
             <a:r>
               <a:rPr lang="en-US" dirty="0"/>
-              <a:t>Ok, unit tests.  First, he makes some examples data and the intended output.  </a:t>
+              <a:t>Initially, Doug is happy with this code. </a:t>
             </a:r>
           </a:p>
           <a:p>
             <a:r>
               <a:rPr lang="en-US" dirty="0"/>
-              <a:t>(click) Then write an automated test that checks that his main function works. </a:t>
+              <a:t>(click) Surely this solution will get Doug that elusive A.</a:t>
             </a:r>
           </a:p>
           <a:p>
             <a:r>
               <a:rPr lang="en-US" dirty="0"/>
-              <a:t>(click) </a:t>
-            </a:r>
-          </a:p>
-          <a:p>
-            <a:r>
-              <a:rPr lang="en-US" dirty="0"/>
-              <a:t>(click) Finally, run the test and make sure the original function passes.</a:t>
+              <a:t>(click) but then he remembers losing points for poor names on previous assignments</a:t>
             </a:r>
           </a:p>
         </p:txBody>
@@ -696,7 +691,7 @@
           <a:p>
             <a:fld id="{175B13A7-3F55-9746-A0A5-C673C1C6AB21}" type="slidenum">
               <a:rPr lang="en-US" smtClean="0"/>
-              <a:t>11</a:t>
+              <a:t>12</a:t>
             </a:fld>
             <a:endParaRPr lang="en-US"/>
           </a:p>
@@ -705,7 +700,7 @@
     </p:spTree>
     <p:extLst>
       <p:ext uri="{BB962C8B-B14F-4D97-AF65-F5344CB8AC3E}">
-        <p14:creationId xmlns:p14="http://schemas.microsoft.com/office/powerpoint/2010/main" val="2993606082"/>
+        <p14:creationId xmlns:p14="http://schemas.microsoft.com/office/powerpoint/2010/main" val="2519584083"/>
       </p:ext>
     </p:extLst>
   </p:cSld>
@@ -761,19 +756,7 @@
           <a:p>
             <a:r>
               <a:rPr lang="en-US" dirty="0"/>
-              <a:t>Initially, Doug is happy with this code. </a:t>
-            </a:r>
-          </a:p>
-          <a:p>
-            <a:r>
-              <a:rPr lang="en-US" dirty="0"/>
-              <a:t>(click) Surely this solution will get Doug that elusive A.</a:t>
-            </a:r>
-          </a:p>
-          <a:p>
-            <a:r>
-              <a:rPr lang="en-US" dirty="0"/>
-              <a:t>(click) but then he remembers losing points for poor names on previous assignments</a:t>
+              <a:t>He thinks back to a lecture on picking good names, remembering that names should express the intent of your code.</a:t>
             </a:r>
           </a:p>
         </p:txBody>
@@ -795,7 +778,7 @@
           <a:p>
             <a:fld id="{175B13A7-3F55-9746-A0A5-C673C1C6AB21}" type="slidenum">
               <a:rPr lang="en-US" smtClean="0"/>
-              <a:t>12</a:t>
+              <a:t>13</a:t>
             </a:fld>
             <a:endParaRPr lang="en-US"/>
           </a:p>
@@ -804,7 +787,7 @@
     </p:spTree>
     <p:extLst>
       <p:ext uri="{BB962C8B-B14F-4D97-AF65-F5344CB8AC3E}">
-        <p14:creationId xmlns:p14="http://schemas.microsoft.com/office/powerpoint/2010/main" val="2519584083"/>
+        <p14:creationId xmlns:p14="http://schemas.microsoft.com/office/powerpoint/2010/main" val="2258884914"/>
       </p:ext>
     </p:extLst>
   </p:cSld>
@@ -860,7 +843,27 @@
           <a:p>
             <a:r>
               <a:rPr lang="en-US" dirty="0"/>
-              <a:t>He thinks back to a lecture on picking good names, remembering that names should express the intent of your code.</a:t>
+              <a:t>Doug looks over his </a:t>
+            </a:r>
+            <a:r>
+              <a:rPr lang="en-US" dirty="0" err="1"/>
+              <a:t>nores</a:t>
+            </a:r>
+            <a:r>
+              <a:rPr lang="en-US" dirty="0"/>
+              <a:t>.</a:t>
+            </a:r>
+          </a:p>
+          <a:p>
+            <a:r>
+              <a:rPr lang="en-US" dirty="0"/>
+              <a:t>(click) So data should say what it is</a:t>
+            </a:r>
+          </a:p>
+          <a:p>
+            <a:r>
+              <a:rPr lang="en-US" dirty="0"/>
+              <a:t>(click) and functions should say what they do.</a:t>
             </a:r>
           </a:p>
         </p:txBody>
@@ -882,7 +885,7 @@
           <a:p>
             <a:fld id="{175B13A7-3F55-9746-A0A5-C673C1C6AB21}" type="slidenum">
               <a:rPr lang="en-US" smtClean="0"/>
-              <a:t>13</a:t>
+              <a:t>14</a:t>
             </a:fld>
             <a:endParaRPr lang="en-US"/>
           </a:p>
@@ -891,7 +894,7 @@
     </p:spTree>
     <p:extLst>
       <p:ext uri="{BB962C8B-B14F-4D97-AF65-F5344CB8AC3E}">
-        <p14:creationId xmlns:p14="http://schemas.microsoft.com/office/powerpoint/2010/main" val="2258884914"/>
+        <p14:creationId xmlns:p14="http://schemas.microsoft.com/office/powerpoint/2010/main" val="1045782465"/>
       </p:ext>
     </p:extLst>
   </p:cSld>
@@ -947,27 +950,25 @@
           <a:p>
             <a:r>
               <a:rPr lang="en-US" dirty="0"/>
-              <a:t>Doug looks over his </a:t>
+              <a:t>Doug notices that next slide talks about using the correct parts of speech.</a:t>
             </a:r>
-            <a:r>
-              <a:rPr lang="en-US" dirty="0" err="1"/>
-              <a:t>nores</a:t>
-            </a:r>
+          </a:p>
+          <a:p>
             <a:r>
               <a:rPr lang="en-US" dirty="0"/>
-              <a:t>.</a:t>
+              <a:t>(click) variables are nouns</a:t>
             </a:r>
           </a:p>
           <a:p>
             <a:r>
               <a:rPr lang="en-US" dirty="0"/>
-              <a:t>(click) So data should say what it is</a:t>
+              <a:t>(click) functions verbs</a:t>
             </a:r>
           </a:p>
           <a:p>
             <a:r>
               <a:rPr lang="en-US" dirty="0"/>
-              <a:t>(click) and functions should say what they do.</a:t>
+              <a:t>(click) and something about Booleans.</a:t>
             </a:r>
           </a:p>
         </p:txBody>
@@ -989,7 +990,7 @@
           <a:p>
             <a:fld id="{175B13A7-3F55-9746-A0A5-C673C1C6AB21}" type="slidenum">
               <a:rPr lang="en-US" smtClean="0"/>
-              <a:t>14</a:t>
+              <a:t>15</a:t>
             </a:fld>
             <a:endParaRPr lang="en-US"/>
           </a:p>
@@ -998,7 +999,7 @@
     </p:spTree>
     <p:extLst>
       <p:ext uri="{BB962C8B-B14F-4D97-AF65-F5344CB8AC3E}">
-        <p14:creationId xmlns:p14="http://schemas.microsoft.com/office/powerpoint/2010/main" val="1045782465"/>
+        <p14:creationId xmlns:p14="http://schemas.microsoft.com/office/powerpoint/2010/main" val="232740320"/>
       </p:ext>
     </p:extLst>
   </p:cSld>
@@ -1054,25 +1055,7 @@
           <a:p>
             <a:r>
               <a:rPr lang="en-US" dirty="0"/>
-              <a:t>Doug notices that next slide talks about using the correct parts of speech.</a:t>
-            </a:r>
-          </a:p>
-          <a:p>
-            <a:r>
-              <a:rPr lang="en-US" dirty="0"/>
-              <a:t>(click) variables are nouns</a:t>
-            </a:r>
-          </a:p>
-          <a:p>
-            <a:r>
-              <a:rPr lang="en-US" dirty="0"/>
-              <a:t>(click) functions verbs</a:t>
-            </a:r>
-          </a:p>
-          <a:p>
-            <a:r>
-              <a:rPr lang="en-US" dirty="0"/>
-              <a:t>(click) and something about Booleans.</a:t>
+              <a:t>Doug looks over his names.  What would Iverson say? </a:t>
             </a:r>
           </a:p>
         </p:txBody>
@@ -1094,7 +1077,7 @@
           <a:p>
             <a:fld id="{175B13A7-3F55-9746-A0A5-C673C1C6AB21}" type="slidenum">
               <a:rPr lang="en-US" smtClean="0"/>
-              <a:t>15</a:t>
+              <a:t>16</a:t>
             </a:fld>
             <a:endParaRPr lang="en-US"/>
           </a:p>
@@ -1103,7 +1086,7 @@
     </p:spTree>
     <p:extLst>
       <p:ext uri="{BB962C8B-B14F-4D97-AF65-F5344CB8AC3E}">
-        <p14:creationId xmlns:p14="http://schemas.microsoft.com/office/powerpoint/2010/main" val="232740320"/>
+        <p14:creationId xmlns:p14="http://schemas.microsoft.com/office/powerpoint/2010/main" val="3798413218"/>
       </p:ext>
     </p:extLst>
   </p:cSld>
@@ -1159,7 +1142,7 @@
           <a:p>
             <a:r>
               <a:rPr lang="en-US" dirty="0"/>
-              <a:t>Doug looks over his names.  What would Iverson say? </a:t>
+              <a:t>He definitely wouldn’t like ews and hws.  He decides to use new names that use the authors last names.</a:t>
             </a:r>
           </a:p>
         </p:txBody>
@@ -1181,7 +1164,7 @@
           <a:p>
             <a:fld id="{175B13A7-3F55-9746-A0A5-C673C1C6AB21}" type="slidenum">
               <a:rPr lang="en-US" smtClean="0"/>
-              <a:t>16</a:t>
+              <a:t>17</a:t>
             </a:fld>
             <a:endParaRPr lang="en-US"/>
           </a:p>
@@ -1190,7 +1173,7 @@
     </p:spTree>
     <p:extLst>
       <p:ext uri="{BB962C8B-B14F-4D97-AF65-F5344CB8AC3E}">
-        <p14:creationId xmlns:p14="http://schemas.microsoft.com/office/powerpoint/2010/main" val="3798413218"/>
+        <p14:creationId xmlns:p14="http://schemas.microsoft.com/office/powerpoint/2010/main" val="2076407096"/>
       </p:ext>
     </p:extLst>
   </p:cSld>
@@ -1246,7 +1229,19 @@
           <a:p>
             <a:r>
               <a:rPr lang="en-US" dirty="0"/>
-              <a:t>He definitely wouldn’t like ews and hws.  He decides to use new names that use the authors last names.</a:t>
+              <a:t>Doug continues to change names, replaces the name for each variable, trying to better capture the indent of the code.  </a:t>
+            </a:r>
+          </a:p>
+          <a:p>
+            <a:r>
+              <a:rPr lang="en-US" dirty="0"/>
+              <a:t>(click) He is now confident in getting an A! </a:t>
+            </a:r>
+          </a:p>
+          <a:p>
+            <a:r>
+              <a:rPr lang="en-US" dirty="0"/>
+              <a:t>(click) Unfortunately, there is a bug in his code, and Iverson gives code that crashes a D.</a:t>
             </a:r>
           </a:p>
         </p:txBody>
@@ -1268,7 +1263,7 @@
           <a:p>
             <a:fld id="{175B13A7-3F55-9746-A0A5-C673C1C6AB21}" type="slidenum">
               <a:rPr lang="en-US" smtClean="0"/>
-              <a:t>17</a:t>
+              <a:t>18</a:t>
             </a:fld>
             <a:endParaRPr lang="en-US"/>
           </a:p>
@@ -1277,7 +1272,7 @@
     </p:spTree>
     <p:extLst>
       <p:ext uri="{BB962C8B-B14F-4D97-AF65-F5344CB8AC3E}">
-        <p14:creationId xmlns:p14="http://schemas.microsoft.com/office/powerpoint/2010/main" val="2076407096"/>
+        <p14:creationId xmlns:p14="http://schemas.microsoft.com/office/powerpoint/2010/main" val="189909672"/>
       </p:ext>
     </p:extLst>
   </p:cSld>
@@ -1331,22 +1326,15 @@
           <a:bodyPr/>
           <a:lstStyle/>
           <a:p>
+            <a:pPr algn="l"/>
             <a:r>
-              <a:rPr lang="en-US" dirty="0"/>
-              <a:t>Doug continues to change names, replaces the name for each variable, trying to better capture the indent of the code.  </a:t>
+              <a:rPr lang="en-US" sz="1200" dirty="0"/>
+              <a:t>It looks like our hero is doomed with D!</a:t>
             </a:r>
           </a:p>
           <a:p>
-            <a:r>
-              <a:rPr lang="en-US" dirty="0"/>
-              <a:t>(click) He is now confident in getting an A! </a:t>
-            </a:r>
-          </a:p>
-          <a:p>
-            <a:r>
-              <a:rPr lang="en-US" dirty="0"/>
-              <a:t>(click) Unfortunately, there is a bug in his code, and Iverson gives code that crashes a D.</a:t>
-            </a:r>
+            <a:pPr algn="l"/>
+            <a:endParaRPr lang="en-US" dirty="0"/>
           </a:p>
         </p:txBody>
       </p:sp>
@@ -1367,7 +1355,7 @@
           <a:p>
             <a:fld id="{175B13A7-3F55-9746-A0A5-C673C1C6AB21}" type="slidenum">
               <a:rPr lang="en-US" smtClean="0"/>
-              <a:t>18</a:t>
+              <a:t>19</a:t>
             </a:fld>
             <a:endParaRPr lang="en-US"/>
           </a:p>
@@ -1376,7 +1364,7 @@
     </p:spTree>
     <p:extLst>
       <p:ext uri="{BB962C8B-B14F-4D97-AF65-F5344CB8AC3E}">
-        <p14:creationId xmlns:p14="http://schemas.microsoft.com/office/powerpoint/2010/main" val="189909672"/>
+        <p14:creationId xmlns:p14="http://schemas.microsoft.com/office/powerpoint/2010/main" val="262980467"/>
       </p:ext>
     </p:extLst>
   </p:cSld>
@@ -1430,15 +1418,27 @@
           <a:bodyPr/>
           <a:lstStyle/>
           <a:p>
-            <a:pPr algn="l"/>
+            <a:pPr marL="0" marR="0" lvl="0" indent="0" algn="l" defTabSz="914400" rtl="0" eaLnBrk="1" fontAlgn="auto" latinLnBrk="0" hangingPunct="1">
+              <a:lnSpc>
+                <a:spcPct val="100000"/>
+              </a:lnSpc>
+              <a:spcBef>
+                <a:spcPts val="0"/>
+              </a:spcBef>
+              <a:spcAft>
+                <a:spcPts val="0"/>
+              </a:spcAft>
+              <a:buClrTx/>
+              <a:buSzTx/>
+              <a:buFontTx/>
+              <a:buNone/>
+              <a:tabLst/>
+              <a:defRPr/>
+            </a:pPr>
             <a:r>
               <a:rPr lang="en-US" sz="1200" dirty="0"/>
-              <a:t>It looks like our hero is doomed with D!</a:t>
+              <a:t>Then just in the nick of time …</a:t>
             </a:r>
-          </a:p>
-          <a:p>
-            <a:pPr algn="l"/>
-            <a:endParaRPr lang="en-US" dirty="0"/>
           </a:p>
         </p:txBody>
       </p:sp>
@@ -1459,7 +1459,7 @@
           <a:p>
             <a:fld id="{175B13A7-3F55-9746-A0A5-C673C1C6AB21}" type="slidenum">
               <a:rPr lang="en-US" smtClean="0"/>
-              <a:t>19</a:t>
+              <a:t>20</a:t>
             </a:fld>
             <a:endParaRPr lang="en-US"/>
           </a:p>
@@ -1468,7 +1468,7 @@
     </p:spTree>
     <p:extLst>
       <p:ext uri="{BB962C8B-B14F-4D97-AF65-F5344CB8AC3E}">
-        <p14:creationId xmlns:p14="http://schemas.microsoft.com/office/powerpoint/2010/main" val="262980467"/>
+        <p14:creationId xmlns:p14="http://schemas.microsoft.com/office/powerpoint/2010/main" val="2041200908"/>
       </p:ext>
     </p:extLst>
   </p:cSld>
@@ -1522,26 +1522,41 @@
           <a:bodyPr/>
           <a:lstStyle/>
           <a:p>
-            <a:pPr marL="0" marR="0" lvl="0" indent="0" algn="l" defTabSz="914400" rtl="0" eaLnBrk="1" fontAlgn="auto" latinLnBrk="0" hangingPunct="1">
-              <a:lnSpc>
-                <a:spcPct val="100000"/>
-              </a:lnSpc>
-              <a:spcBef>
-                <a:spcPts val="0"/>
-              </a:spcBef>
-              <a:spcAft>
-                <a:spcPts val="0"/>
-              </a:spcAft>
-              <a:buClrTx/>
-              <a:buSzTx/>
-              <a:buFontTx/>
-              <a:buNone/>
-              <a:tabLst/>
-              <a:defRPr/>
-            </a:pPr>
             <a:r>
-              <a:rPr lang="en-US" sz="1200" dirty="0"/>
-              <a:t>Then just in the nick of time …</a:t>
+              <a:rPr lang="en-US" dirty="0"/>
+              <a:t>Doug remembers to test.</a:t>
+            </a:r>
+          </a:p>
+          <a:p>
+            <a:r>
+              <a:rPr lang="en-US" dirty="0"/>
+              <a:t>(click) the code fails the test</a:t>
+            </a:r>
+          </a:p>
+          <a:p>
+            <a:r>
+              <a:rPr lang="en-US" dirty="0"/>
+              <a:t>(click) and he figures out that he forgot to change to “</a:t>
+            </a:r>
+            <a:r>
+              <a:rPr lang="en-US" dirty="0" err="1"/>
+              <a:t>a”s</a:t>
+            </a:r>
+            <a:r>
+              <a:rPr lang="en-US" dirty="0"/>
+              <a:t> to “author”</a:t>
+            </a:r>
+          </a:p>
+          <a:p>
+            <a:r>
+              <a:rPr lang="en-US" dirty="0"/>
+              <a:t>(click) he fixes the problem</a:t>
+            </a:r>
+          </a:p>
+          <a:p>
+            <a:r>
+              <a:rPr lang="en-US" dirty="0"/>
+              <a:t>(click) and verifies the code passes his tests.</a:t>
             </a:r>
           </a:p>
         </p:txBody>
@@ -1563,7 +1578,7 @@
           <a:p>
             <a:fld id="{175B13A7-3F55-9746-A0A5-C673C1C6AB21}" type="slidenum">
               <a:rPr lang="en-US" smtClean="0"/>
-              <a:t>20</a:t>
+              <a:t>21</a:t>
             </a:fld>
             <a:endParaRPr lang="en-US"/>
           </a:p>
@@ -1572,7 +1587,7 @@
     </p:spTree>
     <p:extLst>
       <p:ext uri="{BB962C8B-B14F-4D97-AF65-F5344CB8AC3E}">
-        <p14:creationId xmlns:p14="http://schemas.microsoft.com/office/powerpoint/2010/main" val="2041200908"/>
+        <p14:creationId xmlns:p14="http://schemas.microsoft.com/office/powerpoint/2010/main" val="1555934875"/>
       </p:ext>
     </p:extLst>
   </p:cSld>
@@ -1628,13 +1643,16 @@
           <a:p>
             <a:r>
               <a:rPr lang="en-US" dirty="0"/>
-              <a:t>(click) The hero of our drama, Doug Ervison, budding data science major with a penchant to messy code .</a:t>
+              <a:t>Over the last few years, I have been doing some research on software engineering techniques that will help our students.  In this talk I will highlight a few; namely picking good names, using small functions that do one thing, using unit tests to ensure our code is correct, and refactoring our code to make it more modular and readable.</a:t>
             </a:r>
+          </a:p>
+          <a:p>
+            <a:endParaRPr lang="en-US" dirty="0"/>
           </a:p>
           <a:p>
             <a:r>
               <a:rPr lang="en-US" dirty="0"/>
-              <a:t>(click) The villain in this drama is the mean Dr. Iverson, who always complains about Doug’s code.  He sometimes even says it stinks.</a:t>
+              <a:t>But more importantly, this talk tells the story of Doug.</a:t>
             </a:r>
           </a:p>
         </p:txBody>
@@ -1656,7 +1674,7 @@
           <a:p>
             <a:fld id="{175B13A7-3F55-9746-A0A5-C673C1C6AB21}" type="slidenum">
               <a:rPr lang="en-US" smtClean="0"/>
-              <a:t>3</a:t>
+              <a:t>4</a:t>
             </a:fld>
             <a:endParaRPr lang="en-US"/>
           </a:p>
@@ -1665,7 +1683,7 @@
     </p:spTree>
     <p:extLst>
       <p:ext uri="{BB962C8B-B14F-4D97-AF65-F5344CB8AC3E}">
-        <p14:creationId xmlns:p14="http://schemas.microsoft.com/office/powerpoint/2010/main" val="3473931624"/>
+        <p14:creationId xmlns:p14="http://schemas.microsoft.com/office/powerpoint/2010/main" val="3277364110"/>
       </p:ext>
     </p:extLst>
   </p:cSld>
@@ -1721,39 +1739,7 @@
           <a:p>
             <a:r>
               <a:rPr lang="en-US" dirty="0"/>
-              <a:t>Doug remembers to test.</a:t>
-            </a:r>
-          </a:p>
-          <a:p>
-            <a:r>
-              <a:rPr lang="en-US" dirty="0"/>
-              <a:t>(click) the code fails the test</a:t>
-            </a:r>
-          </a:p>
-          <a:p>
-            <a:r>
-              <a:rPr lang="en-US" dirty="0"/>
-              <a:t>(click) and he figures out that he forgot to change to “</a:t>
-            </a:r>
-            <a:r>
-              <a:rPr lang="en-US" dirty="0" err="1"/>
-              <a:t>a”s</a:t>
-            </a:r>
-            <a:r>
-              <a:rPr lang="en-US" dirty="0"/>
-              <a:t> to “author”</a:t>
-            </a:r>
-          </a:p>
-          <a:p>
-            <a:r>
-              <a:rPr lang="en-US" dirty="0"/>
-              <a:t>(click) he fixes the problem</a:t>
-            </a:r>
-          </a:p>
-          <a:p>
-            <a:r>
-              <a:rPr lang="en-US" dirty="0"/>
-              <a:t>(click) and verifies the code passes his tests.</a:t>
+              <a:t>That was close.  So what other changes should he make?</a:t>
             </a:r>
           </a:p>
         </p:txBody>
@@ -1775,7 +1761,7 @@
           <a:p>
             <a:fld id="{175B13A7-3F55-9746-A0A5-C673C1C6AB21}" type="slidenum">
               <a:rPr lang="en-US" smtClean="0"/>
-              <a:t>21</a:t>
+              <a:t>22</a:t>
             </a:fld>
             <a:endParaRPr lang="en-US"/>
           </a:p>
@@ -1784,7 +1770,7 @@
     </p:spTree>
     <p:extLst>
       <p:ext uri="{BB962C8B-B14F-4D97-AF65-F5344CB8AC3E}">
-        <p14:creationId xmlns:p14="http://schemas.microsoft.com/office/powerpoint/2010/main" val="1555934875"/>
+        <p14:creationId xmlns:p14="http://schemas.microsoft.com/office/powerpoint/2010/main" val="422037247"/>
       </p:ext>
     </p:extLst>
   </p:cSld>
@@ -1840,7 +1826,13 @@
           <a:p>
             <a:r>
               <a:rPr lang="en-US" dirty="0"/>
-              <a:t>That was close.  So what other changes should he make?</a:t>
+              <a:t>He remembers that Iverson likes programs with many small functions.</a:t>
+            </a:r>
+          </a:p>
+          <a:p>
+            <a:r>
+              <a:rPr lang="en-US" dirty="0"/>
+              <a:t>(click) and he has one large function.</a:t>
             </a:r>
           </a:p>
         </p:txBody>
@@ -1862,7 +1854,7 @@
           <a:p>
             <a:fld id="{175B13A7-3F55-9746-A0A5-C673C1C6AB21}" type="slidenum">
               <a:rPr lang="en-US" smtClean="0"/>
-              <a:t>22</a:t>
+              <a:t>23</a:t>
             </a:fld>
             <a:endParaRPr lang="en-US"/>
           </a:p>
@@ -1871,7 +1863,7 @@
     </p:spTree>
     <p:extLst>
       <p:ext uri="{BB962C8B-B14F-4D97-AF65-F5344CB8AC3E}">
-        <p14:creationId xmlns:p14="http://schemas.microsoft.com/office/powerpoint/2010/main" val="422037247"/>
+        <p14:creationId xmlns:p14="http://schemas.microsoft.com/office/powerpoint/2010/main" val="399687438"/>
       </p:ext>
     </p:extLst>
   </p:cSld>
@@ -1927,13 +1919,7 @@
           <a:p>
             <a:r>
               <a:rPr lang="en-US" dirty="0"/>
-              <a:t>He remembers that Iverson likes programs with many small functions.</a:t>
-            </a:r>
-          </a:p>
-          <a:p>
-            <a:r>
-              <a:rPr lang="en-US" dirty="0"/>
-              <a:t>(click) and he has one large function.</a:t>
+              <a:t>This reminds him of one of his favorite lectures on extracting functions.</a:t>
             </a:r>
           </a:p>
         </p:txBody>
@@ -1955,7 +1941,7 @@
           <a:p>
             <a:fld id="{175B13A7-3F55-9746-A0A5-C673C1C6AB21}" type="slidenum">
               <a:rPr lang="en-US" smtClean="0"/>
-              <a:t>23</a:t>
+              <a:t>24</a:t>
             </a:fld>
             <a:endParaRPr lang="en-US"/>
           </a:p>
@@ -1964,7 +1950,7 @@
     </p:spTree>
     <p:extLst>
       <p:ext uri="{BB962C8B-B14F-4D97-AF65-F5344CB8AC3E}">
-        <p14:creationId xmlns:p14="http://schemas.microsoft.com/office/powerpoint/2010/main" val="399687438"/>
+        <p14:creationId xmlns:p14="http://schemas.microsoft.com/office/powerpoint/2010/main" val="2364082267"/>
       </p:ext>
     </p:extLst>
   </p:cSld>
@@ -2020,7 +2006,25 @@
           <a:p>
             <a:r>
               <a:rPr lang="en-US" dirty="0"/>
-              <a:t>This reminds him of one of his favorite lectures on extracting functions.</a:t>
+              <a:t>He looks over his notes on extracting functions.</a:t>
+            </a:r>
+          </a:p>
+          <a:p>
+            <a:r>
+              <a:rPr lang="en-US" dirty="0"/>
+              <a:t>(click) so he should find a block that does something</a:t>
+            </a:r>
+          </a:p>
+          <a:p>
+            <a:r>
+              <a:rPr lang="en-US" dirty="0"/>
+              <a:t>(click) extract the code into a function with a good name</a:t>
+            </a:r>
+          </a:p>
+          <a:p>
+            <a:r>
+              <a:rPr lang="en-US" dirty="0"/>
+              <a:t>(click) and replace the original block with a function call.</a:t>
             </a:r>
           </a:p>
         </p:txBody>
@@ -2042,7 +2046,7 @@
           <a:p>
             <a:fld id="{175B13A7-3F55-9746-A0A5-C673C1C6AB21}" type="slidenum">
               <a:rPr lang="en-US" smtClean="0"/>
-              <a:t>24</a:t>
+              <a:t>25</a:t>
             </a:fld>
             <a:endParaRPr lang="en-US"/>
           </a:p>
@@ -2051,7 +2055,7 @@
     </p:spTree>
     <p:extLst>
       <p:ext uri="{BB962C8B-B14F-4D97-AF65-F5344CB8AC3E}">
-        <p14:creationId xmlns:p14="http://schemas.microsoft.com/office/powerpoint/2010/main" val="2364082267"/>
+        <p14:creationId xmlns:p14="http://schemas.microsoft.com/office/powerpoint/2010/main" val="1268387213"/>
       </p:ext>
     </p:extLst>
   </p:cSld>
@@ -2107,25 +2111,7 @@
           <a:p>
             <a:r>
               <a:rPr lang="en-US" dirty="0"/>
-              <a:t>He looks over his notes on extracting functions.</a:t>
-            </a:r>
-          </a:p>
-          <a:p>
-            <a:r>
-              <a:rPr lang="en-US" dirty="0"/>
-              <a:t>(click) so he should find a block that does something</a:t>
-            </a:r>
-          </a:p>
-          <a:p>
-            <a:r>
-              <a:rPr lang="en-US" dirty="0"/>
-              <a:t>(click) extract the code into a function with a good name</a:t>
-            </a:r>
-          </a:p>
-          <a:p>
-            <a:r>
-              <a:rPr lang="en-US" dirty="0"/>
-              <a:t>(click) and replace the original block with a function call.</a:t>
+              <a:t>He also sees that this technique is related to the DRY principle.  Whatever!</a:t>
             </a:r>
           </a:p>
         </p:txBody>
@@ -2147,7 +2133,7 @@
           <a:p>
             <a:fld id="{175B13A7-3F55-9746-A0A5-C673C1C6AB21}" type="slidenum">
               <a:rPr lang="en-US" smtClean="0"/>
-              <a:t>25</a:t>
+              <a:t>26</a:t>
             </a:fld>
             <a:endParaRPr lang="en-US"/>
           </a:p>
@@ -2156,7 +2142,7 @@
     </p:spTree>
     <p:extLst>
       <p:ext uri="{BB962C8B-B14F-4D97-AF65-F5344CB8AC3E}">
-        <p14:creationId xmlns:p14="http://schemas.microsoft.com/office/powerpoint/2010/main" val="1268387213"/>
+        <p14:creationId xmlns:p14="http://schemas.microsoft.com/office/powerpoint/2010/main" val="2899749798"/>
       </p:ext>
     </p:extLst>
   </p:cSld>
@@ -2210,9 +2196,192 @@
           <a:bodyPr/>
           <a:lstStyle/>
           <a:p>
+            <a:pPr marL="0" marR="0" lvl="0" indent="0" algn="l" defTabSz="914400" rtl="0" eaLnBrk="1" fontAlgn="auto" latinLnBrk="0" hangingPunct="1">
+              <a:lnSpc>
+                <a:spcPct val="100000"/>
+              </a:lnSpc>
+              <a:spcBef>
+                <a:spcPts val="0"/>
+              </a:spcBef>
+              <a:spcAft>
+                <a:spcPts val="0"/>
+              </a:spcAft>
+              <a:buClrTx/>
+              <a:buSzTx/>
+              <a:buFontTx/>
+              <a:buNone/>
+              <a:tabLst/>
+              <a:defRPr/>
+            </a:pPr>
             <a:r>
               <a:rPr lang="en-US" dirty="0"/>
-              <a:t>He also sees that this technique is related to the DRY principle.  Whatever!</a:t>
+              <a:t>Doug looks at his code, looking for blocks that do something.  </a:t>
+            </a:r>
+          </a:p>
+          <a:p>
+            <a:pPr marL="0" marR="0" lvl="0" indent="0" algn="l" defTabSz="914400" rtl="0" eaLnBrk="1" fontAlgn="auto" latinLnBrk="0" hangingPunct="1">
+              <a:lnSpc>
+                <a:spcPct val="100000"/>
+              </a:lnSpc>
+              <a:spcBef>
+                <a:spcPts val="0"/>
+              </a:spcBef>
+              <a:spcAft>
+                <a:spcPts val="0"/>
+              </a:spcAft>
+              <a:buClrTx/>
+              <a:buSzTx/>
+              <a:buFontTx/>
+              <a:buNone/>
+              <a:tabLst/>
+              <a:defRPr/>
+            </a:pPr>
+            <a:r>
+              <a:rPr lang="en-US" dirty="0"/>
+              <a:t>(click) He finds some code that replaces hyphens with a space, </a:t>
+            </a:r>
+          </a:p>
+          <a:p>
+            <a:pPr marL="0" marR="0" lvl="0" indent="0" algn="l" defTabSz="914400" rtl="0" eaLnBrk="1" fontAlgn="auto" latinLnBrk="0" hangingPunct="1">
+              <a:lnSpc>
+                <a:spcPct val="100000"/>
+              </a:lnSpc>
+              <a:spcBef>
+                <a:spcPts val="0"/>
+              </a:spcBef>
+              <a:spcAft>
+                <a:spcPts val="0"/>
+              </a:spcAft>
+              <a:buClrTx/>
+              <a:buSzTx/>
+              <a:buFontTx/>
+              <a:buNone/>
+              <a:tabLst/>
+              <a:defRPr/>
+            </a:pPr>
+            <a:r>
+              <a:rPr lang="en-US" dirty="0"/>
+              <a:t>(click) so he extracts that code to a function called </a:t>
+            </a:r>
+            <a:r>
+              <a:rPr lang="en-US" dirty="0" err="1"/>
+              <a:t>replace_hythen</a:t>
+            </a:r>
+            <a:r>
+              <a:rPr lang="en-US" dirty="0"/>
+              <a:t> and</a:t>
+            </a:r>
+          </a:p>
+          <a:p>
+            <a:pPr marL="0" marR="0" lvl="0" indent="0" algn="l" defTabSz="914400" rtl="0" eaLnBrk="1" fontAlgn="auto" latinLnBrk="0" hangingPunct="1">
+              <a:lnSpc>
+                <a:spcPct val="100000"/>
+              </a:lnSpc>
+              <a:spcBef>
+                <a:spcPts val="0"/>
+              </a:spcBef>
+              <a:spcAft>
+                <a:spcPts val="0"/>
+              </a:spcAft>
+              <a:buClrTx/>
+              <a:buSzTx/>
+              <a:buFontTx/>
+              <a:buNone/>
+              <a:tabLst/>
+              <a:defRPr/>
+            </a:pPr>
+            <a:r>
+              <a:rPr lang="en-US" dirty="0"/>
+              <a:t>(click) replaces the original code with a function call.  </a:t>
+            </a:r>
+          </a:p>
+          <a:p>
+            <a:pPr marL="0" marR="0" lvl="0" indent="0" algn="l" defTabSz="914400" rtl="0" eaLnBrk="1" fontAlgn="auto" latinLnBrk="0" hangingPunct="1">
+              <a:lnSpc>
+                <a:spcPct val="100000"/>
+              </a:lnSpc>
+              <a:spcBef>
+                <a:spcPts val="0"/>
+              </a:spcBef>
+              <a:spcAft>
+                <a:spcPts val="0"/>
+              </a:spcAft>
+              <a:buClrTx/>
+              <a:buSzTx/>
+              <a:buFontTx/>
+              <a:buNone/>
+              <a:tabLst/>
+              <a:defRPr/>
+            </a:pPr>
+            <a:r>
+              <a:rPr lang="en-US" dirty="0"/>
+              <a:t>(click) Doug has learned his lesson after almost forgetting to test his name changes.  He runs his unit test.  They pass. </a:t>
+            </a:r>
+          </a:p>
+          <a:p>
+            <a:pPr marL="0" marR="0" lvl="0" indent="0" algn="l" defTabSz="914400" rtl="0" eaLnBrk="1" fontAlgn="auto" latinLnBrk="0" hangingPunct="1">
+              <a:lnSpc>
+                <a:spcPct val="100000"/>
+              </a:lnSpc>
+              <a:spcBef>
+                <a:spcPts val="0"/>
+              </a:spcBef>
+              <a:spcAft>
+                <a:spcPts val="0"/>
+              </a:spcAft>
+              <a:buClrTx/>
+              <a:buSzTx/>
+              <a:buFontTx/>
+              <a:buNone/>
+              <a:tabLst/>
+              <a:defRPr/>
+            </a:pPr>
+            <a:r>
+              <a:rPr lang="en-US" dirty="0"/>
+              <a:t>(click) He also find some code that removes punctuation, and extracts a functions for that as well.  Again his code passes the unit tests.</a:t>
+            </a:r>
+          </a:p>
+          <a:p>
+            <a:pPr marL="0" marR="0" lvl="0" indent="0" algn="l" defTabSz="914400" rtl="0" eaLnBrk="1" fontAlgn="auto" latinLnBrk="0" hangingPunct="1">
+              <a:lnSpc>
+                <a:spcPct val="100000"/>
+              </a:lnSpc>
+              <a:spcBef>
+                <a:spcPts val="0"/>
+              </a:spcBef>
+              <a:spcAft>
+                <a:spcPts val="0"/>
+              </a:spcAft>
+              <a:buClrTx/>
+              <a:buSzTx/>
+              <a:buFontTx/>
+              <a:buNone/>
+              <a:tabLst/>
+              <a:defRPr/>
+            </a:pPr>
+            <a:endParaRPr lang="en-US" dirty="0"/>
+          </a:p>
+          <a:p>
+            <a:pPr marL="0" marR="0" lvl="0" indent="0" algn="l" defTabSz="914400" rtl="0" eaLnBrk="1" fontAlgn="auto" latinLnBrk="0" hangingPunct="1">
+              <a:lnSpc>
+                <a:spcPct val="100000"/>
+              </a:lnSpc>
+              <a:spcBef>
+                <a:spcPts val="0"/>
+              </a:spcBef>
+              <a:spcAft>
+                <a:spcPts val="0"/>
+              </a:spcAft>
+              <a:buClrTx/>
+              <a:buSzTx/>
+              <a:buFontTx/>
+              <a:buNone/>
+              <a:tabLst/>
+              <a:defRPr/>
+            </a:pPr>
+            <a:r>
+              <a:rPr lang="en-US" dirty="0"/>
+              <a:t>(click) Turns out Doug likes to refactor.</a:t>
             </a:r>
           </a:p>
         </p:txBody>
@@ -2234,7 +2403,7 @@
           <a:p>
             <a:fld id="{175B13A7-3F55-9746-A0A5-C673C1C6AB21}" type="slidenum">
               <a:rPr lang="en-US" smtClean="0"/>
-              <a:t>26</a:t>
+              <a:t>27</a:t>
             </a:fld>
             <a:endParaRPr lang="en-US"/>
           </a:p>
@@ -2243,7 +2412,7 @@
     </p:spTree>
     <p:extLst>
       <p:ext uri="{BB962C8B-B14F-4D97-AF65-F5344CB8AC3E}">
-        <p14:creationId xmlns:p14="http://schemas.microsoft.com/office/powerpoint/2010/main" val="2899749798"/>
+        <p14:creationId xmlns:p14="http://schemas.microsoft.com/office/powerpoint/2010/main" val="779481789"/>
       </p:ext>
     </p:extLst>
   </p:cSld>
@@ -2297,6 +2466,30 @@
           <a:bodyPr/>
           <a:lstStyle/>
           <a:p>
+            <a:r>
+              <a:rPr lang="en-US" dirty="0"/>
+              <a:t>This is fun!  Doug decides to extract another function.  </a:t>
+            </a:r>
+          </a:p>
+          <a:p>
+            <a:r>
+              <a:rPr lang="en-US" dirty="0"/>
+              <a:t>(click) This part cleans and splits each block of text.</a:t>
+            </a:r>
+          </a:p>
+          <a:p>
+            <a:r>
+              <a:rPr lang="en-US" dirty="0"/>
+              <a:t>He extracts this function as well and reruns the tests.</a:t>
+            </a:r>
+          </a:p>
+          <a:p>
+            <a:r>
+              <a:rPr lang="en-US" dirty="0"/>
+              <a:t>(click)</a:t>
+            </a:r>
+          </a:p>
+          <a:p>
             <a:pPr marL="0" marR="0" lvl="0" indent="0" algn="l" defTabSz="914400" rtl="0" eaLnBrk="1" fontAlgn="auto" latinLnBrk="0" hangingPunct="1">
               <a:lnSpc>
                 <a:spcPct val="100000"/>
@@ -2316,7 +2509,7 @@
             </a:pPr>
             <a:r>
               <a:rPr lang="en-US" dirty="0"/>
-              <a:t>Doug looks at his code, looking for blocks that do something.  </a:t>
+              <a:t>(click)</a:t>
             </a:r>
           </a:p>
           <a:p>
@@ -2339,151 +2532,11 @@
             </a:pPr>
             <a:r>
               <a:rPr lang="en-US" dirty="0"/>
-              <a:t>(click) He finds some code that replaces hyphens with a space, </a:t>
+              <a:t>(click)</a:t>
             </a:r>
           </a:p>
           <a:p>
-            <a:pPr marL="0" marR="0" lvl="0" indent="0" algn="l" defTabSz="914400" rtl="0" eaLnBrk="1" fontAlgn="auto" latinLnBrk="0" hangingPunct="1">
-              <a:lnSpc>
-                <a:spcPct val="100000"/>
-              </a:lnSpc>
-              <a:spcBef>
-                <a:spcPts val="0"/>
-              </a:spcBef>
-              <a:spcAft>
-                <a:spcPts val="0"/>
-              </a:spcAft>
-              <a:buClrTx/>
-              <a:buSzTx/>
-              <a:buFontTx/>
-              <a:buNone/>
-              <a:tabLst/>
-              <a:defRPr/>
-            </a:pPr>
-            <a:r>
-              <a:rPr lang="en-US" dirty="0"/>
-              <a:t>(click) so he extracts that code to a function called </a:t>
-            </a:r>
-            <a:r>
-              <a:rPr lang="en-US" dirty="0" err="1"/>
-              <a:t>replace_hythen</a:t>
-            </a:r>
-            <a:r>
-              <a:rPr lang="en-US" dirty="0"/>
-              <a:t> and</a:t>
-            </a:r>
-          </a:p>
-          <a:p>
-            <a:pPr marL="0" marR="0" lvl="0" indent="0" algn="l" defTabSz="914400" rtl="0" eaLnBrk="1" fontAlgn="auto" latinLnBrk="0" hangingPunct="1">
-              <a:lnSpc>
-                <a:spcPct val="100000"/>
-              </a:lnSpc>
-              <a:spcBef>
-                <a:spcPts val="0"/>
-              </a:spcBef>
-              <a:spcAft>
-                <a:spcPts val="0"/>
-              </a:spcAft>
-              <a:buClrTx/>
-              <a:buSzTx/>
-              <a:buFontTx/>
-              <a:buNone/>
-              <a:tabLst/>
-              <a:defRPr/>
-            </a:pPr>
-            <a:r>
-              <a:rPr lang="en-US" dirty="0"/>
-              <a:t>(click) replaces the original code with a function call.  </a:t>
-            </a:r>
-          </a:p>
-          <a:p>
-            <a:pPr marL="0" marR="0" lvl="0" indent="0" algn="l" defTabSz="914400" rtl="0" eaLnBrk="1" fontAlgn="auto" latinLnBrk="0" hangingPunct="1">
-              <a:lnSpc>
-                <a:spcPct val="100000"/>
-              </a:lnSpc>
-              <a:spcBef>
-                <a:spcPts val="0"/>
-              </a:spcBef>
-              <a:spcAft>
-                <a:spcPts val="0"/>
-              </a:spcAft>
-              <a:buClrTx/>
-              <a:buSzTx/>
-              <a:buFontTx/>
-              <a:buNone/>
-              <a:tabLst/>
-              <a:defRPr/>
-            </a:pPr>
-            <a:r>
-              <a:rPr lang="en-US" dirty="0"/>
-              <a:t>(click) Doug has learned his lesson after almost forgetting to test his name changes.  He runs his unit test.  They pass. </a:t>
-            </a:r>
-          </a:p>
-          <a:p>
-            <a:pPr marL="0" marR="0" lvl="0" indent="0" algn="l" defTabSz="914400" rtl="0" eaLnBrk="1" fontAlgn="auto" latinLnBrk="0" hangingPunct="1">
-              <a:lnSpc>
-                <a:spcPct val="100000"/>
-              </a:lnSpc>
-              <a:spcBef>
-                <a:spcPts val="0"/>
-              </a:spcBef>
-              <a:spcAft>
-                <a:spcPts val="0"/>
-              </a:spcAft>
-              <a:buClrTx/>
-              <a:buSzTx/>
-              <a:buFontTx/>
-              <a:buNone/>
-              <a:tabLst/>
-              <a:defRPr/>
-            </a:pPr>
-            <a:r>
-              <a:rPr lang="en-US" dirty="0"/>
-              <a:t>(click) He also find some code that removes punctuation, and extracts a functions for that as well.  Again his code passes the unit tests.</a:t>
-            </a:r>
-          </a:p>
-          <a:p>
-            <a:pPr marL="0" marR="0" lvl="0" indent="0" algn="l" defTabSz="914400" rtl="0" eaLnBrk="1" fontAlgn="auto" latinLnBrk="0" hangingPunct="1">
-              <a:lnSpc>
-                <a:spcPct val="100000"/>
-              </a:lnSpc>
-              <a:spcBef>
-                <a:spcPts val="0"/>
-              </a:spcBef>
-              <a:spcAft>
-                <a:spcPts val="0"/>
-              </a:spcAft>
-              <a:buClrTx/>
-              <a:buSzTx/>
-              <a:buFontTx/>
-              <a:buNone/>
-              <a:tabLst/>
-              <a:defRPr/>
-            </a:pPr>
             <a:endParaRPr lang="en-US" dirty="0"/>
-          </a:p>
-          <a:p>
-            <a:pPr marL="0" marR="0" lvl="0" indent="0" algn="l" defTabSz="914400" rtl="0" eaLnBrk="1" fontAlgn="auto" latinLnBrk="0" hangingPunct="1">
-              <a:lnSpc>
-                <a:spcPct val="100000"/>
-              </a:lnSpc>
-              <a:spcBef>
-                <a:spcPts val="0"/>
-              </a:spcBef>
-              <a:spcAft>
-                <a:spcPts val="0"/>
-              </a:spcAft>
-              <a:buClrTx/>
-              <a:buSzTx/>
-              <a:buFontTx/>
-              <a:buNone/>
-              <a:tabLst/>
-              <a:defRPr/>
-            </a:pPr>
-            <a:r>
-              <a:rPr lang="en-US" dirty="0"/>
-              <a:t>(click) Turns out Doug likes to refactor.</a:t>
-            </a:r>
           </a:p>
         </p:txBody>
       </p:sp>
@@ -2504,7 +2557,7 @@
           <a:p>
             <a:fld id="{175B13A7-3F55-9746-A0A5-C673C1C6AB21}" type="slidenum">
               <a:rPr lang="en-US" smtClean="0"/>
-              <a:t>27</a:t>
+              <a:t>28</a:t>
             </a:fld>
             <a:endParaRPr lang="en-US"/>
           </a:p>
@@ -2513,7 +2566,7 @@
     </p:spTree>
     <p:extLst>
       <p:ext uri="{BB962C8B-B14F-4D97-AF65-F5344CB8AC3E}">
-        <p14:creationId xmlns:p14="http://schemas.microsoft.com/office/powerpoint/2010/main" val="779481789"/>
+        <p14:creationId xmlns:p14="http://schemas.microsoft.com/office/powerpoint/2010/main" val="912221461"/>
       </p:ext>
     </p:extLst>
   </p:cSld>
@@ -2569,19 +2622,7 @@
           <a:p>
             <a:r>
               <a:rPr lang="en-US" dirty="0"/>
-              <a:t>This is fun!  Doug decides to extract another function.  </a:t>
-            </a:r>
-          </a:p>
-          <a:p>
-            <a:r>
-              <a:rPr lang="en-US" dirty="0"/>
-              <a:t>(click) This part cleans and splits each block of text.</a:t>
-            </a:r>
-          </a:p>
-          <a:p>
-            <a:r>
-              <a:rPr lang="en-US" dirty="0"/>
-              <a:t>He extracts this function as well and reruns the tests.</a:t>
+              <a:t>Doug really does like to refactor</a:t>
             </a:r>
           </a:p>
           <a:p>
@@ -2591,53 +2632,28 @@
             </a:r>
           </a:p>
           <a:p>
-            <a:pPr marL="0" marR="0" lvl="0" indent="0" algn="l" defTabSz="914400" rtl="0" eaLnBrk="1" fontAlgn="auto" latinLnBrk="0" hangingPunct="1">
-              <a:lnSpc>
-                <a:spcPct val="100000"/>
-              </a:lnSpc>
-              <a:spcBef>
-                <a:spcPts val="0"/>
-              </a:spcBef>
-              <a:spcAft>
-                <a:spcPts val="0"/>
-              </a:spcAft>
-              <a:buClrTx/>
-              <a:buSzTx/>
-              <a:buFontTx/>
-              <a:buNone/>
-              <a:tabLst/>
-              <a:defRPr/>
-            </a:pPr>
             <a:r>
               <a:rPr lang="en-US" dirty="0"/>
-              <a:t>(click)</a:t>
+              <a:t>What other refactoring can he do?  </a:t>
             </a:r>
           </a:p>
           <a:p>
-            <a:pPr marL="0" marR="0" lvl="0" indent="0" algn="l" defTabSz="914400" rtl="0" eaLnBrk="1" fontAlgn="auto" latinLnBrk="0" hangingPunct="1">
-              <a:lnSpc>
-                <a:spcPct val="100000"/>
-              </a:lnSpc>
-              <a:spcBef>
-                <a:spcPts val="0"/>
-              </a:spcBef>
-              <a:spcAft>
-                <a:spcPts val="0"/>
-              </a:spcAft>
-              <a:buClrTx/>
-              <a:buSzTx/>
-              <a:buFontTx/>
-              <a:buNone/>
-              <a:tabLst/>
-              <a:defRPr/>
-            </a:pPr>
             <a:r>
               <a:rPr lang="en-US" dirty="0"/>
-              <a:t>(click)</a:t>
+              <a:t>(click) Remembers that nesting is a sign that a function does to much.</a:t>
             </a:r>
           </a:p>
           <a:p>
-            <a:endParaRPr lang="en-US" dirty="0"/>
+            <a:r>
+              <a:rPr lang="en-US" dirty="0"/>
+              <a:t>(click) and that he should look for repeated blocks of code</a:t>
+            </a:r>
+          </a:p>
+          <a:p>
+            <a:r>
+              <a:rPr lang="en-US" dirty="0"/>
+              <a:t>He remembers something from class about refactoring a loop that does more than one thing.</a:t>
+            </a:r>
           </a:p>
         </p:txBody>
       </p:sp>
@@ -2658,7 +2674,7 @@
           <a:p>
             <a:fld id="{175B13A7-3F55-9746-A0A5-C673C1C6AB21}" type="slidenum">
               <a:rPr lang="en-US" smtClean="0"/>
-              <a:t>28</a:t>
+              <a:t>29</a:t>
             </a:fld>
             <a:endParaRPr lang="en-US"/>
           </a:p>
@@ -2667,7 +2683,7 @@
     </p:spTree>
     <p:extLst>
       <p:ext uri="{BB962C8B-B14F-4D97-AF65-F5344CB8AC3E}">
-        <p14:creationId xmlns:p14="http://schemas.microsoft.com/office/powerpoint/2010/main" val="912221461"/>
+        <p14:creationId xmlns:p14="http://schemas.microsoft.com/office/powerpoint/2010/main" val="2128121114"/>
       </p:ext>
     </p:extLst>
   </p:cSld>
@@ -2723,37 +2739,19 @@
           <a:p>
             <a:r>
               <a:rPr lang="en-US" dirty="0"/>
-              <a:t>Doug really does like to refactor</a:t>
+              <a:t>Doug looks over his notes on splitting a loop.</a:t>
             </a:r>
           </a:p>
           <a:p>
             <a:r>
               <a:rPr lang="en-US" dirty="0"/>
-              <a:t>(click)</a:t>
+              <a:t>(click) you find a loop that does more than one thing</a:t>
             </a:r>
           </a:p>
           <a:p>
             <a:r>
               <a:rPr lang="en-US" dirty="0"/>
-              <a:t>What other refactoring can he do?  </a:t>
-            </a:r>
-          </a:p>
-          <a:p>
-            <a:r>
-              <a:rPr lang="en-US" dirty="0"/>
-              <a:t>(click) Remembers that nesting is a sign that a function does to much.</a:t>
-            </a:r>
-          </a:p>
-          <a:p>
-            <a:r>
-              <a:rPr lang="en-US" dirty="0"/>
-              <a:t>(click) and that he should look for repeated blocks of code</a:t>
-            </a:r>
-          </a:p>
-          <a:p>
-            <a:r>
-              <a:rPr lang="en-US" dirty="0"/>
-              <a:t>He remembers something from class about refactoring a loop that does more than one thing.</a:t>
+              <a:t>(click) then split it into multiple loops that each do one thing.</a:t>
             </a:r>
           </a:p>
         </p:txBody>
@@ -2775,7 +2773,7 @@
           <a:p>
             <a:fld id="{175B13A7-3F55-9746-A0A5-C673C1C6AB21}" type="slidenum">
               <a:rPr lang="en-US" smtClean="0"/>
-              <a:t>29</a:t>
+              <a:t>30</a:t>
             </a:fld>
             <a:endParaRPr lang="en-US"/>
           </a:p>
@@ -2784,7 +2782,7 @@
     </p:spTree>
     <p:extLst>
       <p:ext uri="{BB962C8B-B14F-4D97-AF65-F5344CB8AC3E}">
-        <p14:creationId xmlns:p14="http://schemas.microsoft.com/office/powerpoint/2010/main" val="2128121114"/>
+        <p14:creationId xmlns:p14="http://schemas.microsoft.com/office/powerpoint/2010/main" val="511248368"/>
       </p:ext>
     </p:extLst>
   </p:cSld>
@@ -2840,19 +2838,27 @@
           <a:p>
             <a:r>
               <a:rPr lang="en-US" dirty="0"/>
-              <a:t>Doug looks over his notes on splitting a loop.</a:t>
+              <a:t>Doug applies this technique</a:t>
             </a:r>
           </a:p>
           <a:p>
             <a:r>
               <a:rPr lang="en-US" dirty="0"/>
-              <a:t>(click) you find a loop that does more than one thing</a:t>
+              <a:t>(click) changing the if/else to separate if statements</a:t>
             </a:r>
           </a:p>
           <a:p>
             <a:r>
               <a:rPr lang="en-US" dirty="0"/>
-              <a:t>(click) then split it into multiple loops that each do one thing.</a:t>
+              <a:t>(click) and replacing a temporary variable with separate </a:t>
+            </a:r>
+            <a:r>
+              <a:rPr lang="en-US" dirty="0" err="1"/>
+              <a:t>queires</a:t>
+            </a:r>
+            <a:r>
+              <a:rPr lang="en-US" dirty="0"/>
+              <a:t>.</a:t>
             </a:r>
           </a:p>
         </p:txBody>
@@ -2874,7 +2880,7 @@
           <a:p>
             <a:fld id="{175B13A7-3F55-9746-A0A5-C673C1C6AB21}" type="slidenum">
               <a:rPr lang="en-US" smtClean="0"/>
-              <a:t>30</a:t>
+              <a:t>31</a:t>
             </a:fld>
             <a:endParaRPr lang="en-US"/>
           </a:p>
@@ -2883,7 +2889,7 @@
     </p:spTree>
     <p:extLst>
       <p:ext uri="{BB962C8B-B14F-4D97-AF65-F5344CB8AC3E}">
-        <p14:creationId xmlns:p14="http://schemas.microsoft.com/office/powerpoint/2010/main" val="511248368"/>
+        <p14:creationId xmlns:p14="http://schemas.microsoft.com/office/powerpoint/2010/main" val="1375932349"/>
       </p:ext>
     </p:extLst>
   </p:cSld>
@@ -2939,16 +2945,13 @@
           <a:p>
             <a:r>
               <a:rPr lang="en-US" dirty="0"/>
-              <a:t>Over the last few years, I have been doing some research on software engineering techniques that will help our students.  In this talk I will highlight a few; namely picking good names, using small functions that do one thing, using unit tests to ensure our code is correct, and refactoring our code to make it more modular and readable.</a:t>
+              <a:t>Doug has a problem.  </a:t>
             </a:r>
-          </a:p>
-          <a:p>
-            <a:endParaRPr lang="en-US" dirty="0"/>
           </a:p>
           <a:p>
             <a:r>
               <a:rPr lang="en-US" dirty="0"/>
-              <a:t>But more importantly, this talk tells the story of Doug.</a:t>
+              <a:t>(click) He was assigned a Kaggle assignment for class and he thinks he has a nice solution, but he knows that Dr. Iverson is going to dock points for messy code.</a:t>
             </a:r>
           </a:p>
         </p:txBody>
@@ -2970,7 +2973,7 @@
           <a:p>
             <a:fld id="{175B13A7-3F55-9746-A0A5-C673C1C6AB21}" type="slidenum">
               <a:rPr lang="en-US" smtClean="0"/>
-              <a:t>4</a:t>
+              <a:t>5</a:t>
             </a:fld>
             <a:endParaRPr lang="en-US"/>
           </a:p>
@@ -2979,7 +2982,7 @@
     </p:spTree>
     <p:extLst>
       <p:ext uri="{BB962C8B-B14F-4D97-AF65-F5344CB8AC3E}">
-        <p14:creationId xmlns:p14="http://schemas.microsoft.com/office/powerpoint/2010/main" val="3277364110"/>
+        <p14:creationId xmlns:p14="http://schemas.microsoft.com/office/powerpoint/2010/main" val="3206565137"/>
       </p:ext>
     </p:extLst>
   </p:cSld>
@@ -3035,27 +3038,13 @@
           <a:p>
             <a:r>
               <a:rPr lang="en-US" dirty="0"/>
-              <a:t>Doug applies this technique</a:t>
+              <a:t>Then he splits the 1 loop into 3 loops.</a:t>
             </a:r>
           </a:p>
           <a:p>
             <a:r>
               <a:rPr lang="en-US" dirty="0"/>
-              <a:t>(click) changing the if/else to separate if statements</a:t>
-            </a:r>
-          </a:p>
-          <a:p>
-            <a:r>
-              <a:rPr lang="en-US" dirty="0"/>
-              <a:t>(click) and replacing a temporary variable with separate </a:t>
-            </a:r>
-            <a:r>
-              <a:rPr lang="en-US" dirty="0" err="1"/>
-              <a:t>queires</a:t>
-            </a:r>
-            <a:r>
-              <a:rPr lang="en-US" dirty="0"/>
-              <a:t>.</a:t>
+              <a:t>(click) one for each author.</a:t>
             </a:r>
           </a:p>
         </p:txBody>
@@ -3077,7 +3066,7 @@
           <a:p>
             <a:fld id="{175B13A7-3F55-9746-A0A5-C673C1C6AB21}" type="slidenum">
               <a:rPr lang="en-US" smtClean="0"/>
-              <a:t>31</a:t>
+              <a:t>32</a:t>
             </a:fld>
             <a:endParaRPr lang="en-US"/>
           </a:p>
@@ -3086,7 +3075,7 @@
     </p:spTree>
     <p:extLst>
       <p:ext uri="{BB962C8B-B14F-4D97-AF65-F5344CB8AC3E}">
-        <p14:creationId xmlns:p14="http://schemas.microsoft.com/office/powerpoint/2010/main" val="1375932349"/>
+        <p14:creationId xmlns:p14="http://schemas.microsoft.com/office/powerpoint/2010/main" val="1228056289"/>
       </p:ext>
     </p:extLst>
   </p:cSld>
@@ -3142,14 +3131,52 @@
           <a:p>
             <a:r>
               <a:rPr lang="en-US" dirty="0"/>
-              <a:t>Then he splits the 1 loop into 3 loops.</a:t>
+              <a:t>Now he can extract a loop into a function.</a:t>
             </a:r>
           </a:p>
           <a:p>
             <a:r>
               <a:rPr lang="en-US" dirty="0"/>
-              <a:t>(click) one for each author.</a:t>
+              <a:t>(click)</a:t>
             </a:r>
+          </a:p>
+          <a:p>
+            <a:r>
+              <a:rPr lang="en-US" dirty="0"/>
+              <a:t>And replace each loop with function call</a:t>
+            </a:r>
+          </a:p>
+          <a:p>
+            <a:r>
+              <a:rPr lang="en-US" dirty="0"/>
+              <a:t>(click)</a:t>
+            </a:r>
+          </a:p>
+          <a:p>
+            <a:pPr marL="0" marR="0" lvl="0" indent="0" algn="l" defTabSz="914400" rtl="0" eaLnBrk="1" fontAlgn="auto" latinLnBrk="0" hangingPunct="1">
+              <a:lnSpc>
+                <a:spcPct val="100000"/>
+              </a:lnSpc>
+              <a:spcBef>
+                <a:spcPts val="0"/>
+              </a:spcBef>
+              <a:spcAft>
+                <a:spcPts val="0"/>
+              </a:spcAft>
+              <a:buClrTx/>
+              <a:buSzTx/>
+              <a:buFontTx/>
+              <a:buNone/>
+              <a:tabLst/>
+              <a:defRPr/>
+            </a:pPr>
+            <a:r>
+              <a:rPr lang="en-US" dirty="0"/>
+              <a:t>Now that he’s done it, splitting the loop just feels wrong.  His old code only passed over the data one time, while the new code scans the data three times.  Isn’t this needlessly inefficient?</a:t>
+            </a:r>
+          </a:p>
+          <a:p>
+            <a:endParaRPr lang="en-US" dirty="0"/>
           </a:p>
         </p:txBody>
       </p:sp>
@@ -3170,7 +3197,7 @@
           <a:p>
             <a:fld id="{175B13A7-3F55-9746-A0A5-C673C1C6AB21}" type="slidenum">
               <a:rPr lang="en-US" smtClean="0"/>
-              <a:t>32</a:t>
+              <a:t>33</a:t>
             </a:fld>
             <a:endParaRPr lang="en-US"/>
           </a:p>
@@ -3179,7 +3206,7 @@
     </p:spTree>
     <p:extLst>
       <p:ext uri="{BB962C8B-B14F-4D97-AF65-F5344CB8AC3E}">
-        <p14:creationId xmlns:p14="http://schemas.microsoft.com/office/powerpoint/2010/main" val="1228056289"/>
+        <p14:creationId xmlns:p14="http://schemas.microsoft.com/office/powerpoint/2010/main" val="2370495379"/>
       </p:ext>
     </p:extLst>
   </p:cSld>
@@ -3235,52 +3262,8 @@
           <a:p>
             <a:r>
               <a:rPr lang="en-US" dirty="0"/>
-              <a:t>Now he can extract a loop into a function.</a:t>
+              <a:t>Doug thinks back to what Iverson said in class on efficiency.  So not all parts of your code really matter, and you won’t know which parts matter until after you run your code.  He also remembers that Iverson went on-and-on about some guy named Knuth.</a:t>
             </a:r>
-          </a:p>
-          <a:p>
-            <a:r>
-              <a:rPr lang="en-US" dirty="0"/>
-              <a:t>(click)</a:t>
-            </a:r>
-          </a:p>
-          <a:p>
-            <a:r>
-              <a:rPr lang="en-US" dirty="0"/>
-              <a:t>And replace each loop with function call</a:t>
-            </a:r>
-          </a:p>
-          <a:p>
-            <a:r>
-              <a:rPr lang="en-US" dirty="0"/>
-              <a:t>(click)</a:t>
-            </a:r>
-          </a:p>
-          <a:p>
-            <a:pPr marL="0" marR="0" lvl="0" indent="0" algn="l" defTabSz="914400" rtl="0" eaLnBrk="1" fontAlgn="auto" latinLnBrk="0" hangingPunct="1">
-              <a:lnSpc>
-                <a:spcPct val="100000"/>
-              </a:lnSpc>
-              <a:spcBef>
-                <a:spcPts val="0"/>
-              </a:spcBef>
-              <a:spcAft>
-                <a:spcPts val="0"/>
-              </a:spcAft>
-              <a:buClrTx/>
-              <a:buSzTx/>
-              <a:buFontTx/>
-              <a:buNone/>
-              <a:tabLst/>
-              <a:defRPr/>
-            </a:pPr>
-            <a:r>
-              <a:rPr lang="en-US" dirty="0"/>
-              <a:t>Now that he’s done it, splitting the loop just feels wrong.  His old code only passed over the data one time, while the new code scans the data three times.  Isn’t this needlessly inefficient?</a:t>
-            </a:r>
-          </a:p>
-          <a:p>
-            <a:endParaRPr lang="en-US" dirty="0"/>
           </a:p>
         </p:txBody>
       </p:sp>
@@ -3301,7 +3284,7 @@
           <a:p>
             <a:fld id="{175B13A7-3F55-9746-A0A5-C673C1C6AB21}" type="slidenum">
               <a:rPr lang="en-US" smtClean="0"/>
-              <a:t>33</a:t>
+              <a:t>34</a:t>
             </a:fld>
             <a:endParaRPr lang="en-US"/>
           </a:p>
@@ -3310,7 +3293,7 @@
     </p:spTree>
     <p:extLst>
       <p:ext uri="{BB962C8B-B14F-4D97-AF65-F5344CB8AC3E}">
-        <p14:creationId xmlns:p14="http://schemas.microsoft.com/office/powerpoint/2010/main" val="2370495379"/>
+        <p14:creationId xmlns:p14="http://schemas.microsoft.com/office/powerpoint/2010/main" val="3486198362"/>
       </p:ext>
     </p:extLst>
   </p:cSld>
@@ -3366,7 +3349,7 @@
           <a:p>
             <a:r>
               <a:rPr lang="en-US" dirty="0"/>
-              <a:t>Doug thinks back to what Iverson said in class on efficiency.  So not all parts of your code really matter, and you won’t know which parts matter until after you run your code.  He also remembers that Iverson went on-and-on about some guy named Knuth.</a:t>
+              <a:t>Doug finds that Knuth guy’s quote in his notes.  Hmm, “root of all evil”? That IS strong language.  Ok, so maybe he shouldn’t worry so much about efficiency until he sees that his code is slow.</a:t>
             </a:r>
           </a:p>
         </p:txBody>
@@ -3388,7 +3371,7 @@
           <a:p>
             <a:fld id="{175B13A7-3F55-9746-A0A5-C673C1C6AB21}" type="slidenum">
               <a:rPr lang="en-US" smtClean="0"/>
-              <a:t>34</a:t>
+              <a:t>35</a:t>
             </a:fld>
             <a:endParaRPr lang="en-US"/>
           </a:p>
@@ -3397,7 +3380,7 @@
     </p:spTree>
     <p:extLst>
       <p:ext uri="{BB962C8B-B14F-4D97-AF65-F5344CB8AC3E}">
-        <p14:creationId xmlns:p14="http://schemas.microsoft.com/office/powerpoint/2010/main" val="3486198362"/>
+        <p14:creationId xmlns:p14="http://schemas.microsoft.com/office/powerpoint/2010/main" val="871504330"/>
       </p:ext>
     </p:extLst>
   </p:cSld>
@@ -3453,7 +3436,7 @@
           <a:p>
             <a:r>
               <a:rPr lang="en-US" dirty="0"/>
-              <a:t>Doug finds that Knuth guy’s quote in his notes.  Hmm, “root of all evil”? That IS strong language.  Ok, so maybe he shouldn’t worry so much about efficiency until he sees that his code is slow.</a:t>
+              <a:t>Doug looks over his code one more time.  Everything looks good and he has to admit that it is clean and easier to read.</a:t>
             </a:r>
           </a:p>
         </p:txBody>
@@ -3475,7 +3458,7 @@
           <a:p>
             <a:fld id="{175B13A7-3F55-9746-A0A5-C673C1C6AB21}" type="slidenum">
               <a:rPr lang="en-US" smtClean="0"/>
-              <a:t>35</a:t>
+              <a:t>36</a:t>
             </a:fld>
             <a:endParaRPr lang="en-US"/>
           </a:p>
@@ -3484,7 +3467,7 @@
     </p:spTree>
     <p:extLst>
       <p:ext uri="{BB962C8B-B14F-4D97-AF65-F5344CB8AC3E}">
-        <p14:creationId xmlns:p14="http://schemas.microsoft.com/office/powerpoint/2010/main" val="871504330"/>
+        <p14:creationId xmlns:p14="http://schemas.microsoft.com/office/powerpoint/2010/main" val="881251534"/>
       </p:ext>
     </p:extLst>
   </p:cSld>
@@ -3538,9 +3521,26 @@
           <a:bodyPr/>
           <a:lstStyle/>
           <a:p>
+            <a:pPr marL="0" marR="0" lvl="0" indent="0" algn="l" defTabSz="914400" rtl="0" eaLnBrk="1" fontAlgn="auto" latinLnBrk="0" hangingPunct="1">
+              <a:lnSpc>
+                <a:spcPct val="100000"/>
+              </a:lnSpc>
+              <a:spcBef>
+                <a:spcPts val="0"/>
+              </a:spcBef>
+              <a:spcAft>
+                <a:spcPts val="0"/>
+              </a:spcAft>
+              <a:buClrTx/>
+              <a:buSzTx/>
+              <a:buFontTx/>
+              <a:buNone/>
+              <a:tabLst/>
+              <a:defRPr/>
+            </a:pPr>
             <a:r>
-              <a:rPr lang="en-US" dirty="0"/>
-              <a:t>Doug looks over his code one more time.  Everything looks good and he has to admit that it is clean and easier to read.</a:t>
+              <a:rPr lang="en-US" sz="1200" dirty="0"/>
+              <a:t>Doug’s code is demonstrably better</a:t>
             </a:r>
           </a:p>
         </p:txBody>
@@ -3562,7 +3562,7 @@
           <a:p>
             <a:fld id="{175B13A7-3F55-9746-A0A5-C673C1C6AB21}" type="slidenum">
               <a:rPr lang="en-US" smtClean="0"/>
-              <a:t>36</a:t>
+              <a:t>37</a:t>
             </a:fld>
             <a:endParaRPr lang="en-US"/>
           </a:p>
@@ -3571,7 +3571,7 @@
     </p:spTree>
     <p:extLst>
       <p:ext uri="{BB962C8B-B14F-4D97-AF65-F5344CB8AC3E}">
-        <p14:creationId xmlns:p14="http://schemas.microsoft.com/office/powerpoint/2010/main" val="881251534"/>
+        <p14:creationId xmlns:p14="http://schemas.microsoft.com/office/powerpoint/2010/main" val="4070739172"/>
       </p:ext>
     </p:extLst>
   </p:cSld>
@@ -3625,27 +3625,15 @@
           <a:bodyPr/>
           <a:lstStyle/>
           <a:p>
-            <a:pPr marL="0" marR="0" lvl="0" indent="0" algn="l" defTabSz="914400" rtl="0" eaLnBrk="1" fontAlgn="auto" latinLnBrk="0" hangingPunct="1">
-              <a:lnSpc>
-                <a:spcPct val="100000"/>
-              </a:lnSpc>
-              <a:spcBef>
-                <a:spcPts val="0"/>
-              </a:spcBef>
-              <a:spcAft>
-                <a:spcPts val="0"/>
-              </a:spcAft>
-              <a:buClrTx/>
-              <a:buSzTx/>
-              <a:buFontTx/>
-              <a:buNone/>
-              <a:tabLst/>
-              <a:defRPr/>
-            </a:pPr>
+            <a:pPr algn="l"/>
             <a:r>
               <a:rPr lang="en-US" sz="1200" dirty="0"/>
-              <a:t>Doug’s code is demonstrably better</a:t>
+              <a:t>He clearly took Iverson’s clean code lectures to heart</a:t>
             </a:r>
+          </a:p>
+          <a:p>
+            <a:pPr algn="l"/>
+            <a:endParaRPr lang="en-US" dirty="0"/>
           </a:p>
         </p:txBody>
       </p:sp>
@@ -3666,7 +3654,7 @@
           <a:p>
             <a:fld id="{175B13A7-3F55-9746-A0A5-C673C1C6AB21}" type="slidenum">
               <a:rPr lang="en-US" smtClean="0"/>
-              <a:t>37</a:t>
+              <a:t>38</a:t>
             </a:fld>
             <a:endParaRPr lang="en-US"/>
           </a:p>
@@ -3675,7 +3663,7 @@
     </p:spTree>
     <p:extLst>
       <p:ext uri="{BB962C8B-B14F-4D97-AF65-F5344CB8AC3E}">
-        <p14:creationId xmlns:p14="http://schemas.microsoft.com/office/powerpoint/2010/main" val="4070739172"/>
+        <p14:creationId xmlns:p14="http://schemas.microsoft.com/office/powerpoint/2010/main" val="394331389"/>
       </p:ext>
     </p:extLst>
   </p:cSld>
@@ -3729,15 +3717,10 @@
           <a:bodyPr/>
           <a:lstStyle/>
           <a:p>
-            <a:pPr algn="l"/>
             <a:r>
-              <a:rPr lang="en-US" sz="1200" dirty="0"/>
-              <a:t>He clearly took Iverson’s clean code lectures to heart</a:t>
+              <a:rPr lang="en-US" dirty="0"/>
+              <a:t>And his code consists of small functions with good names</a:t>
             </a:r>
-          </a:p>
-          <a:p>
-            <a:pPr algn="l"/>
-            <a:endParaRPr lang="en-US" dirty="0"/>
           </a:p>
         </p:txBody>
       </p:sp>
@@ -3758,7 +3741,7 @@
           <a:p>
             <a:fld id="{175B13A7-3F55-9746-A0A5-C673C1C6AB21}" type="slidenum">
               <a:rPr lang="en-US" smtClean="0"/>
-              <a:t>38</a:t>
+              <a:t>39</a:t>
             </a:fld>
             <a:endParaRPr lang="en-US"/>
           </a:p>
@@ -3767,7 +3750,7 @@
     </p:spTree>
     <p:extLst>
       <p:ext uri="{BB962C8B-B14F-4D97-AF65-F5344CB8AC3E}">
-        <p14:creationId xmlns:p14="http://schemas.microsoft.com/office/powerpoint/2010/main" val="394331389"/>
+        <p14:creationId xmlns:p14="http://schemas.microsoft.com/office/powerpoint/2010/main" val="1634135172"/>
       </p:ext>
     </p:extLst>
   </p:cSld>
@@ -3823,7 +3806,7 @@
           <a:p>
             <a:r>
               <a:rPr lang="en-US" dirty="0"/>
-              <a:t>And his code consists of small functions with good names</a:t>
+              <a:t>He clearly likes to refactor</a:t>
             </a:r>
           </a:p>
         </p:txBody>
@@ -3845,7 +3828,7 @@
           <a:p>
             <a:fld id="{175B13A7-3F55-9746-A0A5-C673C1C6AB21}" type="slidenum">
               <a:rPr lang="en-US" smtClean="0"/>
-              <a:t>39</a:t>
+              <a:t>40</a:t>
             </a:fld>
             <a:endParaRPr lang="en-US"/>
           </a:p>
@@ -3854,7 +3837,7 @@
     </p:spTree>
     <p:extLst>
       <p:ext uri="{BB962C8B-B14F-4D97-AF65-F5344CB8AC3E}">
-        <p14:creationId xmlns:p14="http://schemas.microsoft.com/office/powerpoint/2010/main" val="1634135172"/>
+        <p14:creationId xmlns:p14="http://schemas.microsoft.com/office/powerpoint/2010/main" val="1552156064"/>
       </p:ext>
     </p:extLst>
   </p:cSld>
@@ -3932,7 +3915,7 @@
           <a:p>
             <a:fld id="{175B13A7-3F55-9746-A0A5-C673C1C6AB21}" type="slidenum">
               <a:rPr lang="en-US" smtClean="0"/>
-              <a:t>40</a:t>
+              <a:t>41</a:t>
             </a:fld>
             <a:endParaRPr lang="en-US"/>
           </a:p>
@@ -3941,7 +3924,7 @@
     </p:spTree>
     <p:extLst>
       <p:ext uri="{BB962C8B-B14F-4D97-AF65-F5344CB8AC3E}">
-        <p14:creationId xmlns:p14="http://schemas.microsoft.com/office/powerpoint/2010/main" val="1552156064"/>
+        <p14:creationId xmlns:p14="http://schemas.microsoft.com/office/powerpoint/2010/main" val="338322473"/>
       </p:ext>
     </p:extLst>
   </p:cSld>
@@ -3997,13 +3980,19 @@
           <a:p>
             <a:r>
               <a:rPr lang="en-US" dirty="0"/>
-              <a:t>Doug has a problem.  </a:t>
+              <a:t>Doug solution is based on the word distributions of each author.  </a:t>
             </a:r>
           </a:p>
           <a:p>
             <a:r>
               <a:rPr lang="en-US" dirty="0"/>
-              <a:t>(click) He was assigned a Kaggle assignment for class and he thinks he has a nice solution, but he knows that Dr. Iverson is going to dock points for messy code.</a:t>
+              <a:t>(click)Surely this solution will get Doug that elusive A.</a:t>
+            </a:r>
+          </a:p>
+          <a:p>
+            <a:r>
+              <a:rPr lang="en-US" dirty="0"/>
+              <a:t>(click)Unfortunately, Doug forgot to look over the requirements for the assignment, which included unit tests for all functions.</a:t>
             </a:r>
           </a:p>
         </p:txBody>
@@ -4025,7 +4014,7 @@
           <a:p>
             <a:fld id="{175B13A7-3F55-9746-A0A5-C673C1C6AB21}" type="slidenum">
               <a:rPr lang="en-US" smtClean="0"/>
-              <a:t>5</a:t>
+              <a:t>6</a:t>
             </a:fld>
             <a:endParaRPr lang="en-US"/>
           </a:p>
@@ -4034,7 +4023,7 @@
     </p:spTree>
     <p:extLst>
       <p:ext uri="{BB962C8B-B14F-4D97-AF65-F5344CB8AC3E}">
-        <p14:creationId xmlns:p14="http://schemas.microsoft.com/office/powerpoint/2010/main" val="3206565137"/>
+        <p14:creationId xmlns:p14="http://schemas.microsoft.com/office/powerpoint/2010/main" val="3225056409"/>
       </p:ext>
     </p:extLst>
   </p:cSld>
@@ -4112,7 +4101,7 @@
           <a:p>
             <a:fld id="{175B13A7-3F55-9746-A0A5-C673C1C6AB21}" type="slidenum">
               <a:rPr lang="en-US" smtClean="0"/>
-              <a:t>41</a:t>
+              <a:t>42</a:t>
             </a:fld>
             <a:endParaRPr lang="en-US"/>
           </a:p>
@@ -4199,7 +4188,7 @@
           <a:p>
             <a:fld id="{175B13A7-3F55-9746-A0A5-C673C1C6AB21}" type="slidenum">
               <a:rPr lang="en-US" smtClean="0"/>
-              <a:t>43</a:t>
+              <a:t>44</a:t>
             </a:fld>
             <a:endParaRPr lang="en-US"/>
           </a:p>
@@ -4306,7 +4295,7 @@
           <a:p>
             <a:fld id="{175B13A7-3F55-9746-A0A5-C673C1C6AB21}" type="slidenum">
               <a:rPr lang="en-US" smtClean="0"/>
-              <a:t>44</a:t>
+              <a:t>45</a:t>
             </a:fld>
             <a:endParaRPr lang="en-US"/>
           </a:p>
@@ -4411,7 +4400,7 @@
           <a:p>
             <a:fld id="{175B13A7-3F55-9746-A0A5-C673C1C6AB21}" type="slidenum">
               <a:rPr lang="en-US" smtClean="0"/>
-              <a:t>45</a:t>
+              <a:t>46</a:t>
             </a:fld>
             <a:endParaRPr lang="en-US"/>
           </a:p>
@@ -4516,7 +4505,7 @@
           <a:p>
             <a:fld id="{175B13A7-3F55-9746-A0A5-C673C1C6AB21}" type="slidenum">
               <a:rPr lang="en-US" smtClean="0"/>
-              <a:t>47</a:t>
+              <a:t>48</a:t>
             </a:fld>
             <a:endParaRPr lang="en-US"/>
           </a:p>
@@ -4615,7 +4604,7 @@
           <a:p>
             <a:fld id="{175B13A7-3F55-9746-A0A5-C673C1C6AB21}" type="slidenum">
               <a:rPr lang="en-US" smtClean="0"/>
-              <a:t>48</a:t>
+              <a:t>49</a:t>
             </a:fld>
             <a:endParaRPr lang="en-US"/>
           </a:p>
@@ -4702,7 +4691,7 @@
           <a:p>
             <a:fld id="{175B13A7-3F55-9746-A0A5-C673C1C6AB21}" type="slidenum">
               <a:rPr lang="en-US" smtClean="0"/>
-              <a:t>49</a:t>
+              <a:t>50</a:t>
             </a:fld>
             <a:endParaRPr lang="en-US"/>
           </a:p>
@@ -4786,7 +4775,7 @@
           <a:p>
             <a:fld id="{175B13A7-3F55-9746-A0A5-C673C1C6AB21}" type="slidenum">
               <a:rPr lang="en-US" smtClean="0"/>
-              <a:t>51</a:t>
+              <a:t>52</a:t>
             </a:fld>
             <a:endParaRPr lang="en-US"/>
           </a:p>
@@ -4849,22 +4838,21 @@
           <a:bodyPr/>
           <a:lstStyle/>
           <a:p>
+            <a:pPr algn="l"/>
             <a:r>
-              <a:rPr lang="en-US" dirty="0"/>
-              <a:t>Doug solution is based on the word distributions of each author.  </a:t>
+              <a:rPr lang="en-US" sz="1200" dirty="0"/>
+              <a:t>It looks like our hero is doomed </a:t>
             </a:r>
           </a:p>
           <a:p>
+            <a:pPr algn="l"/>
             <a:r>
-              <a:rPr lang="en-US" dirty="0"/>
-              <a:t>(click)Surely this solution will get Doug that elusive A.</a:t>
+              <a:rPr lang="en-US" sz="1200" dirty="0"/>
+              <a:t>to an F!</a:t>
             </a:r>
           </a:p>
           <a:p>
-            <a:r>
-              <a:rPr lang="en-US" dirty="0"/>
-              <a:t>(click)Unfortunately, Doug forgot to look over the requirements for the assignment, which included unit tests for all functions.</a:t>
-            </a:r>
+            <a:endParaRPr lang="en-US" dirty="0"/>
           </a:p>
         </p:txBody>
       </p:sp>
@@ -4885,7 +4873,7 @@
           <a:p>
             <a:fld id="{175B13A7-3F55-9746-A0A5-C673C1C6AB21}" type="slidenum">
               <a:rPr lang="en-US" smtClean="0"/>
-              <a:t>6</a:t>
+              <a:t>7</a:t>
             </a:fld>
             <a:endParaRPr lang="en-US"/>
           </a:p>
@@ -4894,7 +4882,7 @@
     </p:spTree>
     <p:extLst>
       <p:ext uri="{BB962C8B-B14F-4D97-AF65-F5344CB8AC3E}">
-        <p14:creationId xmlns:p14="http://schemas.microsoft.com/office/powerpoint/2010/main" val="3225056409"/>
+        <p14:creationId xmlns:p14="http://schemas.microsoft.com/office/powerpoint/2010/main" val="3512127266"/>
       </p:ext>
     </p:extLst>
   </p:cSld>
@@ -4948,17 +4936,26 @@
           <a:bodyPr/>
           <a:lstStyle/>
           <a:p>
-            <a:pPr algn="l"/>
+            <a:pPr marL="0" marR="0" lvl="0" indent="0" algn="l" defTabSz="914400" rtl="0" eaLnBrk="1" fontAlgn="auto" latinLnBrk="0" hangingPunct="1">
+              <a:lnSpc>
+                <a:spcPct val="100000"/>
+              </a:lnSpc>
+              <a:spcBef>
+                <a:spcPts val="0"/>
+              </a:spcBef>
+              <a:spcAft>
+                <a:spcPts val="0"/>
+              </a:spcAft>
+              <a:buClrTx/>
+              <a:buSzTx/>
+              <a:buFontTx/>
+              <a:buNone/>
+              <a:tabLst/>
+              <a:defRPr/>
+            </a:pPr>
             <a:r>
               <a:rPr lang="en-US" sz="1200" dirty="0"/>
-              <a:t>It looks like our hero is doomed </a:t>
-            </a:r>
-          </a:p>
-          <a:p>
-            <a:pPr algn="l"/>
-            <a:r>
-              <a:rPr lang="en-US" sz="1200" dirty="0"/>
-              <a:t>to an F!</a:t>
+              <a:t>Then just in the nick of time …</a:t>
             </a:r>
           </a:p>
           <a:p>
@@ -4983,7 +4980,7 @@
           <a:p>
             <a:fld id="{175B13A7-3F55-9746-A0A5-C673C1C6AB21}" type="slidenum">
               <a:rPr lang="en-US" smtClean="0"/>
-              <a:t>7</a:t>
+              <a:t>8</a:t>
             </a:fld>
             <a:endParaRPr lang="en-US"/>
           </a:p>
@@ -4992,7 +4989,7 @@
     </p:spTree>
     <p:extLst>
       <p:ext uri="{BB962C8B-B14F-4D97-AF65-F5344CB8AC3E}">
-        <p14:creationId xmlns:p14="http://schemas.microsoft.com/office/powerpoint/2010/main" val="3512127266"/>
+        <p14:creationId xmlns:p14="http://schemas.microsoft.com/office/powerpoint/2010/main" val="1423487310"/>
       </p:ext>
     </p:extLst>
   </p:cSld>
@@ -5046,30 +5043,10 @@
           <a:bodyPr/>
           <a:lstStyle/>
           <a:p>
-            <a:pPr marL="0" marR="0" lvl="0" indent="0" algn="l" defTabSz="914400" rtl="0" eaLnBrk="1" fontAlgn="auto" latinLnBrk="0" hangingPunct="1">
-              <a:lnSpc>
-                <a:spcPct val="100000"/>
-              </a:lnSpc>
-              <a:spcBef>
-                <a:spcPts val="0"/>
-              </a:spcBef>
-              <a:spcAft>
-                <a:spcPts val="0"/>
-              </a:spcAft>
-              <a:buClrTx/>
-              <a:buSzTx/>
-              <a:buFontTx/>
-              <a:buNone/>
-              <a:tabLst/>
-              <a:defRPr/>
-            </a:pPr>
             <a:r>
-              <a:rPr lang="en-US" sz="1200" dirty="0"/>
-              <a:t>Then just in the nick of time …</a:t>
+              <a:rPr lang="en-US" dirty="0"/>
+              <a:t>Doug recalls this assignment requires unit tests.  What was it that Iverson said in class about unit test?</a:t>
             </a:r>
-          </a:p>
-          <a:p>
-            <a:endParaRPr lang="en-US" dirty="0"/>
           </a:p>
         </p:txBody>
       </p:sp>
@@ -5090,7 +5067,7 @@
           <a:p>
             <a:fld id="{175B13A7-3F55-9746-A0A5-C673C1C6AB21}" type="slidenum">
               <a:rPr lang="en-US" smtClean="0"/>
-              <a:t>8</a:t>
+              <a:t>9</a:t>
             </a:fld>
             <a:endParaRPr lang="en-US"/>
           </a:p>
@@ -5099,7 +5076,7 @@
     </p:spTree>
     <p:extLst>
       <p:ext uri="{BB962C8B-B14F-4D97-AF65-F5344CB8AC3E}">
-        <p14:creationId xmlns:p14="http://schemas.microsoft.com/office/powerpoint/2010/main" val="1423487310"/>
+        <p14:creationId xmlns:p14="http://schemas.microsoft.com/office/powerpoint/2010/main" val="3335761917"/>
       </p:ext>
     </p:extLst>
   </p:cSld>
@@ -5155,7 +5132,7 @@
           <a:p>
             <a:r>
               <a:rPr lang="en-US" dirty="0"/>
-              <a:t>Doug recalls this assignment requires unit tests.  What was it that Iverson said in class about unit test?</a:t>
+              <a:t>Doug looks back at his notes.  So tests should be automated and capture the behavior of the code.</a:t>
             </a:r>
           </a:p>
         </p:txBody>
@@ -5177,7 +5154,7 @@
           <a:p>
             <a:fld id="{175B13A7-3F55-9746-A0A5-C673C1C6AB21}" type="slidenum">
               <a:rPr lang="en-US" smtClean="0"/>
-              <a:t>9</a:t>
+              <a:t>10</a:t>
             </a:fld>
             <a:endParaRPr lang="en-US"/>
           </a:p>
@@ -5186,7 +5163,7 @@
     </p:spTree>
     <p:extLst>
       <p:ext uri="{BB962C8B-B14F-4D97-AF65-F5344CB8AC3E}">
-        <p14:creationId xmlns:p14="http://schemas.microsoft.com/office/powerpoint/2010/main" val="3335761917"/>
+        <p14:creationId xmlns:p14="http://schemas.microsoft.com/office/powerpoint/2010/main" val="608681677"/>
       </p:ext>
     </p:extLst>
   </p:cSld>
@@ -5242,7 +5219,25 @@
           <a:p>
             <a:r>
               <a:rPr lang="en-US" dirty="0"/>
-              <a:t>Doug looks back at his notes.  So tests should be automated and capture the behavior of the code.</a:t>
+              <a:t>Ok, unit tests.  First, he makes some examples data and the intended output.  </a:t>
+            </a:r>
+          </a:p>
+          <a:p>
+            <a:r>
+              <a:rPr lang="en-US" dirty="0"/>
+              <a:t>(click) Then write an automated test that checks that his main function works. </a:t>
+            </a:r>
+          </a:p>
+          <a:p>
+            <a:r>
+              <a:rPr lang="en-US" dirty="0"/>
+              <a:t>(click) </a:t>
+            </a:r>
+          </a:p>
+          <a:p>
+            <a:r>
+              <a:rPr lang="en-US" dirty="0"/>
+              <a:t>(click) Finally, run the test and make sure the original function passes.</a:t>
             </a:r>
           </a:p>
         </p:txBody>
@@ -5264,7 +5259,7 @@
           <a:p>
             <a:fld id="{175B13A7-3F55-9746-A0A5-C673C1C6AB21}" type="slidenum">
               <a:rPr lang="en-US" smtClean="0"/>
-              <a:t>10</a:t>
+              <a:t>11</a:t>
             </a:fld>
             <a:endParaRPr lang="en-US"/>
           </a:p>
@@ -5273,7 +5268,7 @@
     </p:spTree>
     <p:extLst>
       <p:ext uri="{BB962C8B-B14F-4D97-AF65-F5344CB8AC3E}">
-        <p14:creationId xmlns:p14="http://schemas.microsoft.com/office/powerpoint/2010/main" val="608681677"/>
+        <p14:creationId xmlns:p14="http://schemas.microsoft.com/office/powerpoint/2010/main" val="2993606082"/>
       </p:ext>
     </p:extLst>
   </p:cSld>
@@ -5414,7 +5409,7 @@
           <a:p>
             <a:fld id="{F3F0E5A7-EAF6-2A47-B691-92CEAA1581A9}" type="datetimeFigureOut">
               <a:rPr lang="en-US" smtClean="0"/>
-              <a:t>5/29/19</a:t>
+              <a:t>6/5/19</a:t>
             </a:fld>
             <a:endParaRPr lang="en-US"/>
           </a:p>
@@ -5584,7 +5579,7 @@
           <a:p>
             <a:fld id="{F3F0E5A7-EAF6-2A47-B691-92CEAA1581A9}" type="datetimeFigureOut">
               <a:rPr lang="en-US" smtClean="0"/>
-              <a:t>5/29/19</a:t>
+              <a:t>6/5/19</a:t>
             </a:fld>
             <a:endParaRPr lang="en-US"/>
           </a:p>
@@ -5764,7 +5759,7 @@
           <a:p>
             <a:fld id="{F3F0E5A7-EAF6-2A47-B691-92CEAA1581A9}" type="datetimeFigureOut">
               <a:rPr lang="en-US" smtClean="0"/>
-              <a:t>5/29/19</a:t>
+              <a:t>6/5/19</a:t>
             </a:fld>
             <a:endParaRPr lang="en-US"/>
           </a:p>
@@ -5934,7 +5929,7 @@
           <a:p>
             <a:fld id="{F3F0E5A7-EAF6-2A47-B691-92CEAA1581A9}" type="datetimeFigureOut">
               <a:rPr lang="en-US" smtClean="0"/>
-              <a:t>5/29/19</a:t>
+              <a:t>6/5/19</a:t>
             </a:fld>
             <a:endParaRPr lang="en-US"/>
           </a:p>
@@ -6178,7 +6173,7 @@
           <a:p>
             <a:fld id="{F3F0E5A7-EAF6-2A47-B691-92CEAA1581A9}" type="datetimeFigureOut">
               <a:rPr lang="en-US" smtClean="0"/>
-              <a:t>5/29/19</a:t>
+              <a:t>6/5/19</a:t>
             </a:fld>
             <a:endParaRPr lang="en-US"/>
           </a:p>
@@ -6410,7 +6405,7 @@
           <a:p>
             <a:fld id="{F3F0E5A7-EAF6-2A47-B691-92CEAA1581A9}" type="datetimeFigureOut">
               <a:rPr lang="en-US" smtClean="0"/>
-              <a:t>5/29/19</a:t>
+              <a:t>6/5/19</a:t>
             </a:fld>
             <a:endParaRPr lang="en-US"/>
           </a:p>
@@ -6777,7 +6772,7 @@
           <a:p>
             <a:fld id="{F3F0E5A7-EAF6-2A47-B691-92CEAA1581A9}" type="datetimeFigureOut">
               <a:rPr lang="en-US" smtClean="0"/>
-              <a:t>5/29/19</a:t>
+              <a:t>6/5/19</a:t>
             </a:fld>
             <a:endParaRPr lang="en-US"/>
           </a:p>
@@ -6895,7 +6890,7 @@
           <a:p>
             <a:fld id="{F3F0E5A7-EAF6-2A47-B691-92CEAA1581A9}" type="datetimeFigureOut">
               <a:rPr lang="en-US" smtClean="0"/>
-              <a:t>5/29/19</a:t>
+              <a:t>6/5/19</a:t>
             </a:fld>
             <a:endParaRPr lang="en-US"/>
           </a:p>
@@ -6990,7 +6985,7 @@
           <a:p>
             <a:fld id="{F3F0E5A7-EAF6-2A47-B691-92CEAA1581A9}" type="datetimeFigureOut">
               <a:rPr lang="en-US" smtClean="0"/>
-              <a:t>5/29/19</a:t>
+              <a:t>6/5/19</a:t>
             </a:fld>
             <a:endParaRPr lang="en-US"/>
           </a:p>
@@ -7267,7 +7262,7 @@
           <a:p>
             <a:fld id="{F3F0E5A7-EAF6-2A47-B691-92CEAA1581A9}" type="datetimeFigureOut">
               <a:rPr lang="en-US" smtClean="0"/>
-              <a:t>5/29/19</a:t>
+              <a:t>6/5/19</a:t>
             </a:fld>
             <a:endParaRPr lang="en-US"/>
           </a:p>
@@ -7524,7 +7519,7 @@
           <a:p>
             <a:fld id="{F3F0E5A7-EAF6-2A47-B691-92CEAA1581A9}" type="datetimeFigureOut">
               <a:rPr lang="en-US" smtClean="0"/>
-              <a:t>5/29/19</a:t>
+              <a:t>6/5/19</a:t>
             </a:fld>
             <a:endParaRPr lang="en-US"/>
           </a:p>
@@ -7737,7 +7732,7 @@
           <a:p>
             <a:fld id="{F3F0E5A7-EAF6-2A47-B691-92CEAA1581A9}" type="datetimeFigureOut">
               <a:rPr lang="en-US" smtClean="0"/>
-              <a:t>5/29/19</a:t>
+              <a:t>6/5/19</a:t>
             </a:fld>
             <a:endParaRPr lang="en-US"/>
           </a:p>
@@ -8210,10 +8205,10 @@
       </p:sp>
       <p:sp>
         <p:nvSpPr>
-          <p:cNvPr id="4" name="TextBox 3">
+          <p:cNvPr id="5" name="TextBox 4">
             <a:extLst>
               <a:ext uri="{FF2B5EF4-FFF2-40B4-BE49-F238E27FC236}">
-                <a16:creationId xmlns:a16="http://schemas.microsoft.com/office/drawing/2014/main" id="{B302ECF8-2E08-0949-A6F5-4DF1B49EE300}"/>
+                <a16:creationId xmlns:a16="http://schemas.microsoft.com/office/drawing/2014/main" id="{D9FF6CE2-AC19-024D-A8C6-4C53D868BDF0}"/>
               </a:ext>
             </a:extLst>
           </p:cNvPr>
@@ -8222,8 +8217,8 @@
         </p:nvSpPr>
         <p:spPr>
           <a:xfrm>
-            <a:off x="304800" y="437322"/>
-            <a:ext cx="2231893" cy="369332"/>
+            <a:off x="2964873" y="4245253"/>
+            <a:ext cx="3536737" cy="369332"/>
           </a:xfrm>
           <a:prstGeom prst="rect">
             <a:avLst/>
@@ -8237,18 +8232,19 @@
           <a:lstStyle/>
           <a:p>
             <a:r>
+              <a:rPr lang="en-US" b="1" dirty="0"/>
+              <a:t>Slides/Code: </a:t>
+            </a:r>
+            <a:r>
               <a:rPr lang="en-US" dirty="0">
                 <a:hlinkClick r:id="rId2"/>
               </a:rPr>
-              <a:t>https://bit.ly</a:t>
+              <a:t>https://bit.ly/2WgFIbI</a:t>
             </a:r>
             <a:r>
-              <a:rPr lang="en-US">
-                <a:hlinkClick r:id="rId2"/>
-              </a:rPr>
-              <a:t>/2WgFIbI</a:t>
+              <a:rPr lang="en-US" b="1" dirty="0"/>
+              <a:t> </a:t>
             </a:r>
-            <a:endParaRPr lang="en-US"/>
           </a:p>
         </p:txBody>
       </p:sp>
@@ -8366,13 +8362,13 @@
   <p:clrMapOvr>
     <a:masterClrMapping/>
   </p:clrMapOvr>
-  <mc:AlternateContent xmlns:mc="http://schemas.openxmlformats.org/markup-compatibility/2006">
-    <mc:Choice xmlns:p14="http://schemas.microsoft.com/office/powerpoint/2010/main" Requires="p14">
+  <mc:AlternateContent xmlns:mc="http://schemas.openxmlformats.org/markup-compatibility/2006" xmlns:p14="http://schemas.microsoft.com/office/powerpoint/2010/main">
+    <mc:Choice Requires="p14">
       <p:transition spd="slow" p14:dur="1500">
         <p14:vortex dir="r"/>
       </p:transition>
     </mc:Choice>
-    <mc:Fallback>
+    <mc:Fallback xmlns="">
       <p:transition spd="slow">
         <p:fade/>
       </p:transition>
@@ -9245,13 +9241,13 @@
   <p:clrMapOvr>
     <a:masterClrMapping/>
   </p:clrMapOvr>
-  <mc:AlternateContent xmlns:mc="http://schemas.openxmlformats.org/markup-compatibility/2006">
-    <mc:Choice xmlns:p15="http://schemas.microsoft.com/office/powerpoint/2012/main" Requires="p15">
+  <mc:AlternateContent xmlns:mc="http://schemas.openxmlformats.org/markup-compatibility/2006" xmlns:p15="http://schemas.microsoft.com/office/powerpoint/2012/main">
+    <mc:Choice Requires="p15">
       <p:transition xmlns:p14="http://schemas.microsoft.com/office/powerpoint/2010/main" spd="slow" p14:dur="1500">
         <p15:prstTrans prst="curtains"/>
       </p:transition>
     </mc:Choice>
-    <mc:Fallback>
+    <mc:Fallback xmlns="">
       <p:transition spd="slow">
         <p:fade/>
       </p:transition>
@@ -12570,13 +12566,13 @@
   <p:clrMapOvr>
     <a:masterClrMapping/>
   </p:clrMapOvr>
-  <mc:AlternateContent xmlns:mc="http://schemas.openxmlformats.org/markup-compatibility/2006">
-    <mc:Choice xmlns:p14="http://schemas.microsoft.com/office/powerpoint/2010/main" Requires="p14">
+  <mc:AlternateContent xmlns:mc="http://schemas.openxmlformats.org/markup-compatibility/2006" xmlns:p14="http://schemas.microsoft.com/office/powerpoint/2010/main">
+    <mc:Choice Requires="p14">
       <p:transition spd="slow" p14:dur="1500">
         <p14:vortex dir="r"/>
       </p:transition>
     </mc:Choice>
-    <mc:Fallback>
+    <mc:Fallback xmlns="">
       <p:transition spd="slow">
         <p:fade/>
       </p:transition>
@@ -13914,13 +13910,13 @@
   <p:clrMapOvr>
     <a:masterClrMapping/>
   </p:clrMapOvr>
-  <mc:AlternateContent xmlns:mc="http://schemas.openxmlformats.org/markup-compatibility/2006">
-    <mc:Choice xmlns:p15="http://schemas.microsoft.com/office/powerpoint/2012/main" Requires="p15">
+  <mc:AlternateContent xmlns:mc="http://schemas.openxmlformats.org/markup-compatibility/2006" xmlns:p15="http://schemas.microsoft.com/office/powerpoint/2012/main">
+    <mc:Choice Requires="p15">
       <p:transition xmlns:p14="http://schemas.microsoft.com/office/powerpoint/2010/main" spd="slow" p14:dur="1500">
         <p15:prstTrans prst="curtains"/>
       </p:transition>
     </mc:Choice>
-    <mc:Fallback>
+    <mc:Fallback xmlns="">
       <p:transition spd="slow">
         <p:fade/>
       </p:transition>
@@ -14660,13 +14656,13 @@
   <p:clrMapOvr>
     <a:masterClrMapping/>
   </p:clrMapOvr>
-  <mc:AlternateContent xmlns:mc="http://schemas.openxmlformats.org/markup-compatibility/2006">
-    <mc:Choice xmlns:p15="http://schemas.microsoft.com/office/powerpoint/2012/main" Requires="p15">
+  <mc:AlternateContent xmlns:mc="http://schemas.openxmlformats.org/markup-compatibility/2006" xmlns:p15="http://schemas.microsoft.com/office/powerpoint/2012/main">
+    <mc:Choice Requires="p15">
       <p:transition xmlns:p14="http://schemas.microsoft.com/office/powerpoint/2010/main" spd="slow" p14:dur="1500">
         <p15:prstTrans prst="curtains"/>
       </p:transition>
     </mc:Choice>
-    <mc:Fallback>
+    <mc:Fallback xmlns="">
       <p:transition spd="slow">
         <p:fade/>
       </p:transition>
@@ -16308,7 +16304,7 @@
                               <p:par>
                                 <p:cTn id="31" presetID="1" presetClass="entr" presetSubtype="0" fill="hold" grpId="0" nodeType="afterEffect">
                                   <p:stCondLst>
-                                    <p:cond delay="0"/>
+                                    <p:cond delay="500"/>
                                   </p:stCondLst>
                                   <p:childTnLst>
                                     <p:set>
@@ -16338,13 +16334,13 @@
                         <p:par>
                           <p:cTn id="33" fill="hold">
                             <p:stCondLst>
-                              <p:cond delay="0"/>
+                              <p:cond delay="500"/>
                             </p:stCondLst>
                             <p:childTnLst>
                               <p:par>
                                 <p:cTn id="34" presetID="1" presetClass="entr" presetSubtype="0" fill="hold" grpId="0" nodeType="afterEffect">
                                   <p:stCondLst>
-                                    <p:cond delay="0"/>
+                                    <p:cond delay="500"/>
                                   </p:stCondLst>
                                   <p:childTnLst>
                                     <p:set>
@@ -16481,13 +16477,13 @@
   <p:clrMapOvr>
     <a:masterClrMapping/>
   </p:clrMapOvr>
-  <mc:AlternateContent xmlns:mc="http://schemas.openxmlformats.org/markup-compatibility/2006">
-    <mc:Choice xmlns:p14="http://schemas.microsoft.com/office/powerpoint/2010/main" Requires="p14">
+  <mc:AlternateContent xmlns:mc="http://schemas.openxmlformats.org/markup-compatibility/2006" xmlns:p14="http://schemas.microsoft.com/office/powerpoint/2010/main">
+    <mc:Choice Requires="p14">
       <p:transition spd="slow" p14:dur="800">
         <p14:flythrough/>
       </p:transition>
     </mc:Choice>
-    <mc:Fallback>
+    <mc:Fallback xmlns="">
       <p:transition spd="slow">
         <p:fade/>
       </p:transition>
@@ -16518,7 +16514,7 @@
           <p:cNvPr id="2" name="Title 1">
             <a:extLst>
               <a:ext uri="{FF2B5EF4-FFF2-40B4-BE49-F238E27FC236}">
-                <a16:creationId xmlns:a16="http://schemas.microsoft.com/office/drawing/2014/main" id="{D53A24AB-5DFC-CF46-B38A-B6B79180244F}"/>
+                <a16:creationId xmlns:a16="http://schemas.microsoft.com/office/drawing/2014/main" id="{F1EAD462-3617-0A45-9F5F-490A00C39DBD}"/>
               </a:ext>
             </a:extLst>
           </p:cNvPr>
@@ -16536,17 +16532,17 @@
           <a:p>
             <a:r>
               <a:rPr lang="en-US" dirty="0"/>
-              <a:t>Three important concepts from software engineering</a:t>
+              <a:t>Episode 37</a:t>
             </a:r>
           </a:p>
         </p:txBody>
       </p:sp>
       <p:sp>
         <p:nvSpPr>
-          <p:cNvPr id="3" name="Content Placeholder 2">
+          <p:cNvPr id="3" name="Text Placeholder 2">
             <a:extLst>
               <a:ext uri="{FF2B5EF4-FFF2-40B4-BE49-F238E27FC236}">
-                <a16:creationId xmlns:a16="http://schemas.microsoft.com/office/drawing/2014/main" id="{0D771957-0F67-CE41-ABC6-24D2F1238DA2}"/>
+                <a16:creationId xmlns:a16="http://schemas.microsoft.com/office/drawing/2014/main" id="{0BA81FF5-8BCD-924B-82DF-E986C5269895}"/>
               </a:ext>
             </a:extLst>
           </p:cNvPr>
@@ -16554,7 +16550,7 @@
             <a:spLocks noGrp="1"/>
           </p:cNvSpPr>
           <p:nvPr>
-            <p:ph idx="1"/>
+            <p:ph type="body" idx="1"/>
           </p:nvPr>
         </p:nvSpPr>
         <p:spPr/>
@@ -16562,79 +16558,9 @@
           <a:bodyPr/>
           <a:lstStyle/>
           <a:p>
-            <a:pPr marL="514350" indent="-514350">
-              <a:buFont typeface="+mj-lt"/>
-              <a:buAutoNum type="arabicPeriod"/>
-            </a:pPr>
-            <a:r>
-              <a:rPr lang="en-US" b="1" dirty="0"/>
-              <a:t>Clean code</a:t>
-            </a:r>
             <a:r>
               <a:rPr lang="en-US" dirty="0"/>
-              <a:t> reads like prose</a:t>
-            </a:r>
-          </a:p>
-          <a:p>
-            <a:pPr marL="971550" lvl="1" indent="-514350">
-              <a:buFont typeface="+mj-lt"/>
-              <a:buAutoNum type="arabicPeriod"/>
-            </a:pPr>
-            <a:r>
-              <a:rPr lang="en-US" dirty="0"/>
-              <a:t>I will focus on names and small functions</a:t>
-            </a:r>
-          </a:p>
-          <a:p>
-            <a:pPr marL="514350" indent="-514350">
-              <a:buFont typeface="+mj-lt"/>
-              <a:buAutoNum type="arabicPeriod"/>
-            </a:pPr>
-            <a:r>
-              <a:rPr lang="en-US" dirty="0"/>
-              <a:t>Use </a:t>
-            </a:r>
-            <a:r>
-              <a:rPr lang="en-US" b="1" dirty="0"/>
-              <a:t>unit tests</a:t>
-            </a:r>
-            <a:r>
-              <a:rPr lang="en-US" dirty="0"/>
-              <a:t> to ensure correct code</a:t>
-            </a:r>
-          </a:p>
-          <a:p>
-            <a:pPr marL="514350" indent="-514350">
-              <a:buFont typeface="+mj-lt"/>
-              <a:buAutoNum type="arabicPeriod"/>
-            </a:pPr>
-            <a:r>
-              <a:rPr lang="en-US" b="1" dirty="0"/>
-              <a:t>Refactor</a:t>
-            </a:r>
-            <a:r>
-              <a:rPr lang="en-US" dirty="0"/>
-              <a:t> code to</a:t>
-            </a:r>
-          </a:p>
-          <a:p>
-            <a:pPr marL="971550" lvl="1" indent="-514350">
-              <a:buFont typeface="+mj-lt"/>
-              <a:buAutoNum type="arabicPeriod"/>
-            </a:pPr>
-            <a:r>
-              <a:rPr lang="en-US" dirty="0"/>
-              <a:t>Extract functions</a:t>
-            </a:r>
-          </a:p>
-          <a:p>
-            <a:pPr marL="971550" lvl="1" indent="-514350">
-              <a:buFont typeface="+mj-lt"/>
-              <a:buAutoNum type="arabicPeriod"/>
-            </a:pPr>
-            <a:r>
-              <a:rPr lang="en-US" dirty="0"/>
-              <a:t>Split loops</a:t>
+              <a:t>Doug Wants an A</a:t>
             </a:r>
           </a:p>
         </p:txBody>
@@ -16642,7 +16568,7 @@
     </p:spTree>
     <p:extLst>
       <p:ext uri="{BB962C8B-B14F-4D97-AF65-F5344CB8AC3E}">
-        <p14:creationId xmlns:p14="http://schemas.microsoft.com/office/powerpoint/2010/main" val="2093112435"/>
+        <p14:creationId xmlns:p14="http://schemas.microsoft.com/office/powerpoint/2010/main" val="3375461271"/>
       </p:ext>
     </p:extLst>
   </p:cSld>
@@ -16715,13 +16641,13 @@
   <p:clrMapOvr>
     <a:masterClrMapping/>
   </p:clrMapOvr>
-  <mc:AlternateContent xmlns:mc="http://schemas.openxmlformats.org/markup-compatibility/2006">
-    <mc:Choice xmlns:p14="http://schemas.microsoft.com/office/powerpoint/2010/main" Requires="p14">
+  <mc:AlternateContent xmlns:mc="http://schemas.openxmlformats.org/markup-compatibility/2006" xmlns:p14="http://schemas.microsoft.com/office/powerpoint/2010/main">
+    <mc:Choice Requires="p14">
       <p:transition spd="slow" p14:dur="800">
         <p14:flythrough/>
       </p:transition>
     </mc:Choice>
-    <mc:Fallback>
+    <mc:Fallback xmlns="">
       <p:transition spd="slow">
         <p:fade/>
       </p:transition>
@@ -17880,13 +17806,13 @@
   <p:clrMapOvr>
     <a:masterClrMapping/>
   </p:clrMapOvr>
-  <mc:AlternateContent xmlns:mc="http://schemas.openxmlformats.org/markup-compatibility/2006">
-    <mc:Choice xmlns:p15="http://schemas.microsoft.com/office/powerpoint/2012/main" Requires="p15">
+  <mc:AlternateContent xmlns:mc="http://schemas.openxmlformats.org/markup-compatibility/2006" xmlns:p15="http://schemas.microsoft.com/office/powerpoint/2012/main">
+    <mc:Choice Requires="p15">
       <p:transition xmlns:p14="http://schemas.microsoft.com/office/powerpoint/2010/main" spd="slow" p14:dur="1500">
         <p15:prstTrans prst="curtains"/>
       </p:transition>
     </mc:Choice>
-    <mc:Fallback>
+    <mc:Fallback xmlns="">
       <p:transition spd="slow">
         <p:fade/>
       </p:transition>
@@ -18976,60 +18902,6 @@
                                   </p:childTnLst>
                                 </p:cTn>
                               </p:par>
-                              <p:par>
-                                <p:cTn id="7" presetID="1" presetClass="exit" presetSubtype="0" fill="hold" grpId="0" nodeType="withEffect">
-                                  <p:stCondLst>
-                                    <p:cond delay="0"/>
-                                  </p:stCondLst>
-                                  <p:childTnLst>
-                                    <p:set>
-                                      <p:cBhvr>
-                                        <p:cTn id="8" dur="1" fill="hold">
-                                          <p:stCondLst>
-                                            <p:cond delay="0"/>
-                                          </p:stCondLst>
-                                        </p:cTn>
-                                        <p:tgtEl>
-                                          <p:spTgt spid="32"/>
-                                        </p:tgtEl>
-                                        <p:attrNameLst>
-                                          <p:attrName>style.visibility</p:attrName>
-                                        </p:attrNameLst>
-                                      </p:cBhvr>
-                                      <p:to>
-                                        <p:strVal val="hidden"/>
-                                      </p:to>
-                                    </p:set>
-                                  </p:childTnLst>
-                                </p:cTn>
-                              </p:par>
-                              <p:par>
-                                <p:cTn id="9" presetID="1" presetClass="exit" presetSubtype="0" fill="hold" nodeType="withEffect">
-                                  <p:stCondLst>
-                                    <p:cond delay="0"/>
-                                  </p:stCondLst>
-                                  <p:childTnLst>
-                                    <p:set>
-                                      <p:cBhvr>
-                                        <p:cTn id="10" dur="1" fill="hold">
-                                          <p:stCondLst>
-                                            <p:cond delay="0"/>
-                                          </p:stCondLst>
-                                        </p:cTn>
-                                        <p:tgtEl>
-                                          <p:spTgt spid="21"/>
-                                        </p:tgtEl>
-                                        <p:attrNameLst>
-                                          <p:attrName>style.visibility</p:attrName>
-                                        </p:attrNameLst>
-                                      </p:cBhvr>
-                                      <p:to>
-                                        <p:strVal val="hidden"/>
-                                      </p:to>
-                                    </p:set>
-                                  </p:childTnLst>
-                                </p:cTn>
-                              </p:par>
                             </p:childTnLst>
                           </p:cTn>
                         </p:par>
@@ -19058,7 +18930,6 @@
       </p:par>
     </p:tnLst>
     <p:bldLst>
-      <p:bldP spid="32" grpId="0" animBg="1"/>
       <p:bldP spid="32" grpId="1" animBg="1"/>
     </p:bldLst>
   </p:timing>
@@ -20009,13 +19880,13 @@
   <p:clrMapOvr>
     <a:masterClrMapping/>
   </p:clrMapOvr>
-  <mc:AlternateContent xmlns:mc="http://schemas.openxmlformats.org/markup-compatibility/2006">
-    <mc:Choice xmlns:p15="http://schemas.microsoft.com/office/powerpoint/2012/main" Requires="p15">
+  <mc:AlternateContent xmlns:mc="http://schemas.openxmlformats.org/markup-compatibility/2006" xmlns:p15="http://schemas.microsoft.com/office/powerpoint/2012/main">
+    <mc:Choice Requires="p15">
       <p:transition xmlns:p14="http://schemas.microsoft.com/office/powerpoint/2010/main" spd="slow" p14:dur="1500">
         <p15:prstTrans prst="curtains"/>
       </p:transition>
     </mc:Choice>
-    <mc:Fallback>
+    <mc:Fallback xmlns="">
       <p:transition spd="slow">
         <p:fade/>
       </p:transition>
@@ -22823,13 +22694,13 @@
   <p:clrMapOvr>
     <a:masterClrMapping/>
   </p:clrMapOvr>
-  <mc:AlternateContent xmlns:mc="http://schemas.openxmlformats.org/markup-compatibility/2006">
-    <mc:Choice xmlns:p14="http://schemas.microsoft.com/office/powerpoint/2010/main" Requires="p14">
+  <mc:AlternateContent xmlns:mc="http://schemas.openxmlformats.org/markup-compatibility/2006" xmlns:p14="http://schemas.microsoft.com/office/powerpoint/2010/main">
+    <mc:Choice Requires="p14">
       <p:transition spd="slow" p14:dur="1500">
         <p14:vortex dir="r"/>
       </p:transition>
     </mc:Choice>
-    <mc:Fallback>
+    <mc:Fallback xmlns="">
       <p:transition spd="slow">
         <p:fade/>
       </p:transition>
@@ -24870,13 +24741,13 @@
   <p:clrMapOvr>
     <a:masterClrMapping/>
   </p:clrMapOvr>
-  <mc:AlternateContent xmlns:mc="http://schemas.openxmlformats.org/markup-compatibility/2006">
-    <mc:Choice xmlns:p15="http://schemas.microsoft.com/office/powerpoint/2012/main" Requires="p15">
+  <mc:AlternateContent xmlns:mc="http://schemas.openxmlformats.org/markup-compatibility/2006" xmlns:p15="http://schemas.microsoft.com/office/powerpoint/2012/main">
+    <mc:Choice Requires="p15">
       <p:transition xmlns:p14="http://schemas.microsoft.com/office/powerpoint/2010/main" spd="slow" p14:dur="1500">
         <p15:prstTrans prst="curtains"/>
       </p:transition>
     </mc:Choice>
-    <mc:Fallback>
+    <mc:Fallback xmlns="">
       <p:transition spd="slow">
         <p:fade/>
       </p:transition>
@@ -32986,13 +32857,13 @@
   <p:clrMapOvr>
     <a:masterClrMapping/>
   </p:clrMapOvr>
-  <mc:AlternateContent xmlns:mc="http://schemas.openxmlformats.org/markup-compatibility/2006">
-    <mc:Choice xmlns:p14="http://schemas.microsoft.com/office/powerpoint/2010/main" Requires="p14">
+  <mc:AlternateContent xmlns:mc="http://schemas.openxmlformats.org/markup-compatibility/2006" xmlns:p14="http://schemas.microsoft.com/office/powerpoint/2010/main">
+    <mc:Choice Requires="p14">
       <p:transition spd="slow" p14:dur="1500">
         <p14:vortex dir="r"/>
       </p:transition>
     </mc:Choice>
-    <mc:Fallback>
+    <mc:Fallback xmlns="">
       <p:transition spd="slow">
         <p:fade/>
       </p:transition>
@@ -38582,13 +38453,13 @@
   <p:clrMapOvr>
     <a:masterClrMapping/>
   </p:clrMapOvr>
-  <mc:AlternateContent xmlns:mc="http://schemas.openxmlformats.org/markup-compatibility/2006">
-    <mc:Choice xmlns:p15="http://schemas.microsoft.com/office/powerpoint/2012/main" Requires="p15">
+  <mc:AlternateContent xmlns:mc="http://schemas.openxmlformats.org/markup-compatibility/2006" xmlns:p15="http://schemas.microsoft.com/office/powerpoint/2012/main">
+    <mc:Choice Requires="p15">
       <p:transition xmlns:p14="http://schemas.microsoft.com/office/powerpoint/2010/main" spd="slow" p14:dur="1500">
         <p15:prstTrans prst="curtains"/>
       </p:transition>
     </mc:Choice>
-    <mc:Fallback>
+    <mc:Fallback xmlns="">
       <p:transition spd="slow">
         <p:fade/>
       </p:transition>
@@ -39699,13 +39570,13 @@
   <p:clrMapOvr>
     <a:masterClrMapping/>
   </p:clrMapOvr>
-  <mc:AlternateContent xmlns:mc="http://schemas.openxmlformats.org/markup-compatibility/2006">
-    <mc:Choice xmlns:p14="http://schemas.microsoft.com/office/powerpoint/2010/main" Requires="p14">
+  <mc:AlternateContent xmlns:mc="http://schemas.openxmlformats.org/markup-compatibility/2006" xmlns:p14="http://schemas.microsoft.com/office/powerpoint/2010/main">
+    <mc:Choice Requires="p14">
       <p:transition spd="slow" p14:dur="1500">
         <p14:vortex dir="r"/>
       </p:transition>
     </mc:Choice>
-    <mc:Fallback>
+    <mc:Fallback xmlns="">
       <p:transition spd="slow">
         <p:fade/>
       </p:transition>
@@ -40671,13 +40542,13 @@
   <p:clrMapOvr>
     <a:masterClrMapping/>
   </p:clrMapOvr>
-  <mc:AlternateContent xmlns:mc="http://schemas.openxmlformats.org/markup-compatibility/2006">
-    <mc:Choice xmlns:p15="http://schemas.microsoft.com/office/powerpoint/2012/main" Requires="p15">
+  <mc:AlternateContent xmlns:mc="http://schemas.openxmlformats.org/markup-compatibility/2006" xmlns:p15="http://schemas.microsoft.com/office/powerpoint/2012/main">
+    <mc:Choice Requires="p15">
       <p:transition xmlns:p14="http://schemas.microsoft.com/office/powerpoint/2010/main" spd="slow" p14:dur="1500">
         <p15:prstTrans prst="curtains"/>
       </p:transition>
     </mc:Choice>
-    <mc:Fallback>
+    <mc:Fallback xmlns="">
       <p:transition spd="slow">
         <p:fade/>
       </p:transition>
@@ -40904,13 +40775,13 @@
   <p:clrMapOvr>
     <a:masterClrMapping/>
   </p:clrMapOvr>
-  <mc:AlternateContent xmlns:mc="http://schemas.openxmlformats.org/markup-compatibility/2006">
-    <mc:Choice xmlns:p14="http://schemas.microsoft.com/office/powerpoint/2010/main" Requires="p14">
+  <mc:AlternateContent xmlns:mc="http://schemas.openxmlformats.org/markup-compatibility/2006" xmlns:p14="http://schemas.microsoft.com/office/powerpoint/2010/main">
+    <mc:Choice Requires="p14">
       <p:transition spd="slow" p14:dur="900">
         <p14:warp dir="in"/>
       </p:transition>
     </mc:Choice>
-    <mc:Fallback>
+    <mc:Fallback xmlns="">
       <p:transition spd="slow">
         <p:fade/>
       </p:transition>
@@ -40989,13 +40860,13 @@
   <p:clrMapOvr>
     <a:masterClrMapping/>
   </p:clrMapOvr>
-  <mc:AlternateContent xmlns:mc="http://schemas.openxmlformats.org/markup-compatibility/2006">
-    <mc:Choice xmlns:p14="http://schemas.microsoft.com/office/powerpoint/2010/main" Requires="p14">
+  <mc:AlternateContent xmlns:mc="http://schemas.openxmlformats.org/markup-compatibility/2006" xmlns:p14="http://schemas.microsoft.com/office/powerpoint/2010/main">
+    <mc:Choice Requires="p14">
       <p:transition spd="slow" p14:dur="800">
         <p14:flythrough/>
       </p:transition>
     </mc:Choice>
-    <mc:Fallback>
+    <mc:Fallback xmlns="">
       <p:transition spd="slow">
         <p:fade/>
       </p:transition>
@@ -41081,13 +40952,13 @@
   <p:clrMapOvr>
     <a:masterClrMapping/>
   </p:clrMapOvr>
-  <mc:AlternateContent xmlns:mc="http://schemas.openxmlformats.org/markup-compatibility/2006">
-    <mc:Choice xmlns:p14="http://schemas.microsoft.com/office/powerpoint/2010/main" Requires="p14">
+  <mc:AlternateContent xmlns:mc="http://schemas.openxmlformats.org/markup-compatibility/2006" xmlns:p14="http://schemas.microsoft.com/office/powerpoint/2010/main">
+    <mc:Choice Requires="p14">
       <p:transition spd="slow" p14:dur="800">
         <p14:flythrough/>
       </p:transition>
     </mc:Choice>
-    <mc:Fallback>
+    <mc:Fallback xmlns="">
       <p:transition spd="slow">
         <p:fade/>
       </p:transition>
@@ -41305,13 +41176,13 @@
   <p:clrMapOvr>
     <a:masterClrMapping/>
   </p:clrMapOvr>
-  <mc:AlternateContent xmlns:mc="http://schemas.openxmlformats.org/markup-compatibility/2006">
-    <mc:Choice xmlns:p14="http://schemas.microsoft.com/office/powerpoint/2010/main" Requires="p14">
+  <mc:AlternateContent xmlns:mc="http://schemas.openxmlformats.org/markup-compatibility/2006" xmlns:p14="http://schemas.microsoft.com/office/powerpoint/2010/main">
+    <mc:Choice Requires="p14">
       <p:transition spd="slow" p14:dur="800">
         <p14:flythrough/>
       </p:transition>
     </mc:Choice>
-    <mc:Fallback>
+    <mc:Fallback xmlns="">
       <p:transition spd="slow">
         <p:fade/>
       </p:transition>
@@ -41321,6 +41192,84 @@
 </file>
 
 <file path=ppt/slides/slide41.xml><?xml version="1.0" encoding="utf-8"?>
+<p:sld xmlns:a="http://schemas.openxmlformats.org/drawingml/2006/main" xmlns:r="http://schemas.openxmlformats.org/officeDocument/2006/relationships" xmlns:p="http://schemas.openxmlformats.org/presentationml/2006/main">
+  <p:cSld>
+    <p:spTree>
+      <p:nvGrpSpPr>
+        <p:cNvPr id="1" name=""/>
+        <p:cNvGrpSpPr/>
+        <p:nvPr/>
+      </p:nvGrpSpPr>
+      <p:grpSpPr>
+        <a:xfrm>
+          <a:off x="0" y="0"/>
+          <a:ext cx="0" cy="0"/>
+          <a:chOff x="0" y="0"/>
+          <a:chExt cx="0" cy="0"/>
+        </a:xfrm>
+      </p:grpSpPr>
+      <p:sp>
+        <p:nvSpPr>
+          <p:cNvPr id="2" name="TextBox 1">
+            <a:extLst>
+              <a:ext uri="{FF2B5EF4-FFF2-40B4-BE49-F238E27FC236}">
+                <a16:creationId xmlns:a16="http://schemas.microsoft.com/office/drawing/2014/main" id="{C742F475-01EA-EE49-9DE2-A51DF8293D47}"/>
+              </a:ext>
+            </a:extLst>
+          </p:cNvPr>
+          <p:cNvSpPr txBox="1"/>
+          <p:nvPr/>
+        </p:nvSpPr>
+        <p:spPr>
+          <a:xfrm>
+            <a:off x="1614144" y="2969112"/>
+            <a:ext cx="5752730" cy="769441"/>
+          </a:xfrm>
+          <a:prstGeom prst="rect">
+            <a:avLst/>
+          </a:prstGeom>
+          <a:noFill/>
+        </p:spPr>
+        <p:txBody>
+          <a:bodyPr wrap="none" rtlCol="0">
+            <a:spAutoFit/>
+          </a:bodyPr>
+          <a:lstStyle/>
+          <a:p>
+            <a:pPr algn="ctr"/>
+            <a:r>
+              <a:rPr lang="en-US" sz="4400" dirty="0"/>
+              <a:t>So does Doug get the A?</a:t>
+            </a:r>
+          </a:p>
+        </p:txBody>
+      </p:sp>
+    </p:spTree>
+    <p:extLst>
+      <p:ext uri="{BB962C8B-B14F-4D97-AF65-F5344CB8AC3E}">
+        <p14:creationId xmlns:p14="http://schemas.microsoft.com/office/powerpoint/2010/main" val="3604056383"/>
+      </p:ext>
+    </p:extLst>
+  </p:cSld>
+  <p:clrMapOvr>
+    <a:masterClrMapping/>
+  </p:clrMapOvr>
+  <mc:AlternateContent xmlns:mc="http://schemas.openxmlformats.org/markup-compatibility/2006" xmlns:p14="http://schemas.microsoft.com/office/powerpoint/2010/main">
+    <mc:Choice Requires="p14">
+      <p:transition spd="slow" p14:dur="800">
+        <p14:flythrough/>
+      </p:transition>
+    </mc:Choice>
+    <mc:Fallback xmlns="">
+      <p:transition spd="slow">
+        <p:fade/>
+      </p:transition>
+    </mc:Fallback>
+  </mc:AlternateContent>
+</p:sld>
+</file>
+
+<file path=ppt/slides/slide42.xml><?xml version="1.0" encoding="utf-8"?>
 <p:sld xmlns:a="http://schemas.openxmlformats.org/drawingml/2006/main" xmlns:r="http://schemas.openxmlformats.org/officeDocument/2006/relationships" xmlns:p="http://schemas.openxmlformats.org/presentationml/2006/main">
   <p:cSld>
     <p:spTree>
@@ -41929,13 +41878,13 @@
   <p:clrMapOvr>
     <a:masterClrMapping/>
   </p:clrMapOvr>
-  <mc:AlternateContent xmlns:mc="http://schemas.openxmlformats.org/markup-compatibility/2006">
-    <mc:Choice xmlns:p14="http://schemas.microsoft.com/office/powerpoint/2010/main" Requires="p14">
+  <mc:AlternateContent xmlns:mc="http://schemas.openxmlformats.org/markup-compatibility/2006" xmlns:p14="http://schemas.microsoft.com/office/powerpoint/2010/main">
+    <mc:Choice Requires="p14">
       <p:transition spd="slow" p14:dur="2000">
         <p14:prism isContent="1"/>
       </p:transition>
     </mc:Choice>
-    <mc:Fallback>
+    <mc:Fallback xmlns="">
       <p:transition spd="slow">
         <p:fade/>
       </p:transition>
@@ -42187,7 +42136,7 @@
 </p:sld>
 </file>
 
-<file path=ppt/slides/slide42.xml><?xml version="1.0" encoding="utf-8"?>
+<file path=ppt/slides/slide43.xml><?xml version="1.0" encoding="utf-8"?>
 <p:sld xmlns:a="http://schemas.openxmlformats.org/drawingml/2006/main" xmlns:r="http://schemas.openxmlformats.org/officeDocument/2006/relationships" xmlns:p="http://schemas.openxmlformats.org/presentationml/2006/main">
   <p:cSld>
     <p:spTree>
@@ -42245,7 +42194,7 @@
 </p:sld>
 </file>
 
-<file path=ppt/slides/slide43.xml><?xml version="1.0" encoding="utf-8"?>
+<file path=ppt/slides/slide44.xml><?xml version="1.0" encoding="utf-8"?>
 <p:sld xmlns:a="http://schemas.openxmlformats.org/drawingml/2006/main" xmlns:r="http://schemas.openxmlformats.org/officeDocument/2006/relationships" xmlns:p="http://schemas.openxmlformats.org/presentationml/2006/main">
   <p:cSld>
     <p:spTree>
@@ -42349,7 +42298,7 @@
 </p:sld>
 </file>
 
-<file path=ppt/slides/slide44.xml><?xml version="1.0" encoding="utf-8"?>
+<file path=ppt/slides/slide45.xml><?xml version="1.0" encoding="utf-8"?>
 <p:sld xmlns:a="http://schemas.openxmlformats.org/drawingml/2006/main" xmlns:r="http://schemas.openxmlformats.org/officeDocument/2006/relationships" xmlns:p="http://schemas.openxmlformats.org/presentationml/2006/main">
   <p:cSld>
     <p:spTree>
@@ -42866,7 +42815,7 @@
 </p:sld>
 </file>
 
-<file path=ppt/slides/slide45.xml><?xml version="1.0" encoding="utf-8"?>
+<file path=ppt/slides/slide46.xml><?xml version="1.0" encoding="utf-8"?>
 <p:sld xmlns:a="http://schemas.openxmlformats.org/drawingml/2006/main" xmlns:r="http://schemas.openxmlformats.org/officeDocument/2006/relationships" xmlns:p="http://schemas.openxmlformats.org/presentationml/2006/main">
   <p:cSld>
     <p:spTree>
@@ -43444,7 +43393,7 @@
 </p:sld>
 </file>
 
-<file path=ppt/slides/slide46.xml><?xml version="1.0" encoding="utf-8"?>
+<file path=ppt/slides/slide47.xml><?xml version="1.0" encoding="utf-8"?>
 <p:sld xmlns:a="http://schemas.openxmlformats.org/drawingml/2006/main" xmlns:r="http://schemas.openxmlformats.org/officeDocument/2006/relationships" xmlns:p="http://schemas.openxmlformats.org/presentationml/2006/main">
   <p:cSld>
     <p:spTree>
@@ -43638,7 +43587,7 @@
 </p:sld>
 </file>
 
-<file path=ppt/slides/slide47.xml><?xml version="1.0" encoding="utf-8"?>
+<file path=ppt/slides/slide48.xml><?xml version="1.0" encoding="utf-8"?>
 <p:sld xmlns:a="http://schemas.openxmlformats.org/drawingml/2006/main" xmlns:r="http://schemas.openxmlformats.org/officeDocument/2006/relationships" xmlns:p="http://schemas.openxmlformats.org/presentationml/2006/main">
   <p:cSld>
     <p:spTree>
@@ -45331,18 +45280,6 @@
   <p:clrMapOvr>
     <a:masterClrMapping/>
   </p:clrMapOvr>
-  <mc:AlternateContent xmlns:mc="http://schemas.openxmlformats.org/markup-compatibility/2006">
-    <mc:Choice xmlns:p14="http://schemas.microsoft.com/office/powerpoint/2010/main" Requires="p14">
-      <p:transition spd="slow" p14:dur="1500">
-        <p14:vortex dir="r"/>
-      </p:transition>
-    </mc:Choice>
-    <mc:Fallback>
-      <p:transition spd="slow">
-        <p:fade/>
-      </p:transition>
-    </mc:Fallback>
-  </mc:AlternateContent>
   <p:timing>
     <p:tnLst>
       <p:par>
@@ -45776,7 +45713,7 @@
 </p:sld>
 </file>
 
-<file path=ppt/slides/slide48.xml><?xml version="1.0" encoding="utf-8"?>
+<file path=ppt/slides/slide49.xml><?xml version="1.0" encoding="utf-8"?>
 <p:sld xmlns:a="http://schemas.openxmlformats.org/drawingml/2006/main" xmlns:r="http://schemas.openxmlformats.org/officeDocument/2006/relationships" xmlns:p="http://schemas.openxmlformats.org/presentationml/2006/main">
   <p:cSld>
     <p:spTree>
@@ -48074,110 +48011,6 @@
 </p:sld>
 </file>
 
-<file path=ppt/slides/slide49.xml><?xml version="1.0" encoding="utf-8"?>
-<p:sld xmlns:a="http://schemas.openxmlformats.org/drawingml/2006/main" xmlns:r="http://schemas.openxmlformats.org/officeDocument/2006/relationships" xmlns:p="http://schemas.openxmlformats.org/presentationml/2006/main">
-  <p:cSld>
-    <p:spTree>
-      <p:nvGrpSpPr>
-        <p:cNvPr id="1" name=""/>
-        <p:cNvGrpSpPr/>
-        <p:nvPr/>
-      </p:nvGrpSpPr>
-      <p:grpSpPr>
-        <a:xfrm>
-          <a:off x="0" y="0"/>
-          <a:ext cx="0" cy="0"/>
-          <a:chOff x="0" y="0"/>
-          <a:chExt cx="0" cy="0"/>
-        </a:xfrm>
-      </p:grpSpPr>
-      <p:sp>
-        <p:nvSpPr>
-          <p:cNvPr id="4" name="Title 3">
-            <a:extLst>
-              <a:ext uri="{FF2B5EF4-FFF2-40B4-BE49-F238E27FC236}">
-                <a16:creationId xmlns:a16="http://schemas.microsoft.com/office/drawing/2014/main" id="{D5E39191-F331-EC44-BDF9-ACDEA29CC022}"/>
-              </a:ext>
-            </a:extLst>
-          </p:cNvPr>
-          <p:cNvSpPr>
-            <a:spLocks noGrp="1"/>
-          </p:cNvSpPr>
-          <p:nvPr>
-            <p:ph type="title"/>
-          </p:nvPr>
-        </p:nvSpPr>
-        <p:spPr/>
-        <p:txBody>
-          <a:bodyPr/>
-          <a:lstStyle/>
-          <a:p>
-            <a:r>
-              <a:rPr lang="en-US" dirty="0"/>
-              <a:t>The DRY principle</a:t>
-            </a:r>
-          </a:p>
-        </p:txBody>
-      </p:sp>
-      <p:sp>
-        <p:nvSpPr>
-          <p:cNvPr id="5" name="Content Placeholder 4">
-            <a:extLst>
-              <a:ext uri="{FF2B5EF4-FFF2-40B4-BE49-F238E27FC236}">
-                <a16:creationId xmlns:a16="http://schemas.microsoft.com/office/drawing/2014/main" id="{577A2421-41CF-E544-824F-6D1C1B04F678}"/>
-              </a:ext>
-            </a:extLst>
-          </p:cNvPr>
-          <p:cNvSpPr>
-            <a:spLocks noGrp="1"/>
-          </p:cNvSpPr>
-          <p:nvPr>
-            <p:ph idx="1"/>
-          </p:nvPr>
-        </p:nvSpPr>
-        <p:spPr/>
-        <p:txBody>
-          <a:bodyPr/>
-          <a:lstStyle/>
-          <a:p>
-            <a:r>
-              <a:rPr lang="en-US" dirty="0"/>
-              <a:t>Don’t repeat yourself!</a:t>
-            </a:r>
-          </a:p>
-          <a:p>
-            <a:r>
-              <a:rPr lang="en-US" dirty="0"/>
-              <a:t>Find similar code</a:t>
-            </a:r>
-          </a:p>
-          <a:p>
-            <a:r>
-              <a:rPr lang="en-US" dirty="0"/>
-              <a:t>Make it exactly the same</a:t>
-            </a:r>
-          </a:p>
-          <a:p>
-            <a:r>
-              <a:rPr lang="en-US" dirty="0"/>
-              <a:t>Extract a function!</a:t>
-            </a:r>
-          </a:p>
-        </p:txBody>
-      </p:sp>
-    </p:spTree>
-    <p:extLst>
-      <p:ext uri="{BB962C8B-B14F-4D97-AF65-F5344CB8AC3E}">
-        <p14:creationId xmlns:p14="http://schemas.microsoft.com/office/powerpoint/2010/main" val="4065643628"/>
-      </p:ext>
-    </p:extLst>
-  </p:cSld>
-  <p:clrMapOvr>
-    <a:masterClrMapping/>
-  </p:clrMapOvr>
-</p:sld>
-</file>
-
 <file path=ppt/slides/slide5.xml><?xml version="1.0" encoding="utf-8"?>
 <p:sld xmlns:a="http://schemas.openxmlformats.org/drawingml/2006/main" xmlns:r="http://schemas.openxmlformats.org/officeDocument/2006/relationships" xmlns:p="http://schemas.openxmlformats.org/presentationml/2006/main">
   <p:cSld>
@@ -48876,13 +48709,13 @@
   <p:clrMapOvr>
     <a:masterClrMapping/>
   </p:clrMapOvr>
-  <mc:AlternateContent xmlns:mc="http://schemas.openxmlformats.org/markup-compatibility/2006">
-    <mc:Choice xmlns:p15="http://schemas.microsoft.com/office/powerpoint/2012/main" Requires="p15">
+  <mc:AlternateContent xmlns:mc="http://schemas.openxmlformats.org/markup-compatibility/2006" xmlns:p15="http://schemas.microsoft.com/office/powerpoint/2012/main">
+    <mc:Choice Requires="p15">
       <p:transition xmlns:p14="http://schemas.microsoft.com/office/powerpoint/2010/main" spd="slow" p14:dur="1500">
         <p15:prstTrans prst="curtains"/>
       </p:transition>
     </mc:Choice>
-    <mc:Fallback>
+    <mc:Fallback xmlns="">
       <p:transition spd="slow">
         <p:fade/>
       </p:transition>
@@ -49062,6 +48895,110 @@
       </p:grpSpPr>
       <p:sp>
         <p:nvSpPr>
+          <p:cNvPr id="4" name="Title 3">
+            <a:extLst>
+              <a:ext uri="{FF2B5EF4-FFF2-40B4-BE49-F238E27FC236}">
+                <a16:creationId xmlns:a16="http://schemas.microsoft.com/office/drawing/2014/main" id="{D5E39191-F331-EC44-BDF9-ACDEA29CC022}"/>
+              </a:ext>
+            </a:extLst>
+          </p:cNvPr>
+          <p:cNvSpPr>
+            <a:spLocks noGrp="1"/>
+          </p:cNvSpPr>
+          <p:nvPr>
+            <p:ph type="title"/>
+          </p:nvPr>
+        </p:nvSpPr>
+        <p:spPr/>
+        <p:txBody>
+          <a:bodyPr/>
+          <a:lstStyle/>
+          <a:p>
+            <a:r>
+              <a:rPr lang="en-US" dirty="0"/>
+              <a:t>The DRY principle</a:t>
+            </a:r>
+          </a:p>
+        </p:txBody>
+      </p:sp>
+      <p:sp>
+        <p:nvSpPr>
+          <p:cNvPr id="5" name="Content Placeholder 4">
+            <a:extLst>
+              <a:ext uri="{FF2B5EF4-FFF2-40B4-BE49-F238E27FC236}">
+                <a16:creationId xmlns:a16="http://schemas.microsoft.com/office/drawing/2014/main" id="{577A2421-41CF-E544-824F-6D1C1B04F678}"/>
+              </a:ext>
+            </a:extLst>
+          </p:cNvPr>
+          <p:cNvSpPr>
+            <a:spLocks noGrp="1"/>
+          </p:cNvSpPr>
+          <p:nvPr>
+            <p:ph idx="1"/>
+          </p:nvPr>
+        </p:nvSpPr>
+        <p:spPr/>
+        <p:txBody>
+          <a:bodyPr/>
+          <a:lstStyle/>
+          <a:p>
+            <a:r>
+              <a:rPr lang="en-US" dirty="0"/>
+              <a:t>Don’t repeat yourself!</a:t>
+            </a:r>
+          </a:p>
+          <a:p>
+            <a:r>
+              <a:rPr lang="en-US" dirty="0"/>
+              <a:t>Find similar code</a:t>
+            </a:r>
+          </a:p>
+          <a:p>
+            <a:r>
+              <a:rPr lang="en-US" dirty="0"/>
+              <a:t>Make it exactly the same</a:t>
+            </a:r>
+          </a:p>
+          <a:p>
+            <a:r>
+              <a:rPr lang="en-US" dirty="0"/>
+              <a:t>Extract a function!</a:t>
+            </a:r>
+          </a:p>
+        </p:txBody>
+      </p:sp>
+    </p:spTree>
+    <p:extLst>
+      <p:ext uri="{BB962C8B-B14F-4D97-AF65-F5344CB8AC3E}">
+        <p14:creationId xmlns:p14="http://schemas.microsoft.com/office/powerpoint/2010/main" val="4065643628"/>
+      </p:ext>
+    </p:extLst>
+  </p:cSld>
+  <p:clrMapOvr>
+    <a:masterClrMapping/>
+  </p:clrMapOvr>
+</p:sld>
+</file>
+
+<file path=ppt/slides/slide51.xml><?xml version="1.0" encoding="utf-8"?>
+<p:sld xmlns:a="http://schemas.openxmlformats.org/drawingml/2006/main" xmlns:r="http://schemas.openxmlformats.org/officeDocument/2006/relationships" xmlns:p="http://schemas.openxmlformats.org/presentationml/2006/main">
+  <p:cSld>
+    <p:spTree>
+      <p:nvGrpSpPr>
+        <p:cNvPr id="1" name=""/>
+        <p:cNvGrpSpPr/>
+        <p:nvPr/>
+      </p:nvGrpSpPr>
+      <p:grpSpPr>
+        <a:xfrm>
+          <a:off x="0" y="0"/>
+          <a:ext cx="0" cy="0"/>
+          <a:chOff x="0" y="0"/>
+          <a:chExt cx="0" cy="0"/>
+        </a:xfrm>
+      </p:grpSpPr>
+      <p:sp>
+        <p:nvSpPr>
           <p:cNvPr id="2" name="Title 1">
             <a:extLst>
               <a:ext uri="{FF2B5EF4-FFF2-40B4-BE49-F238E27FC236}">
@@ -49174,7 +49111,7 @@
 </p:sld>
 </file>
 
-<file path=ppt/slides/slide51.xml><?xml version="1.0" encoding="utf-8"?>
+<file path=ppt/slides/slide52.xml><?xml version="1.0" encoding="utf-8"?>
 <p:sld xmlns:a="http://schemas.openxmlformats.org/drawingml/2006/main" xmlns:r="http://schemas.openxmlformats.org/officeDocument/2006/relationships" xmlns:p="http://schemas.openxmlformats.org/presentationml/2006/main">
   <p:cSld>
     <p:spTree>
@@ -49244,21 +49181,28 @@
               <a:rPr lang="en-US" dirty="0"/>
               <a:t>These slides: </a:t>
             </a:r>
-          </a:p>
-          <a:p>
             <a:r>
-              <a:rPr lang="en-US" i="1" dirty="0"/>
+              <a:rPr lang="en-US" dirty="0">
+                <a:hlinkClick r:id="rId3"/>
+              </a:rPr>
+              <a:t>https://bit.ly/2WgFIb</a:t>
+            </a:r>
+            <a:endParaRPr lang="en-US" dirty="0"/>
+          </a:p>
+          <a:p>
+            <a:r>
+              <a:rPr lang="en-US" b="1" i="1" dirty="0"/>
               <a:t>Clean Code</a:t>
             </a:r>
             <a:r>
               <a:rPr lang="en-US" dirty="0"/>
-              <a:t>, a book by Robert Martin</a:t>
+              <a:t>, by Robert Martin</a:t>
             </a:r>
           </a:p>
           <a:p>
             <a:r>
               <a:rPr lang="en-US" dirty="0">
-                <a:hlinkClick r:id="rId3"/>
+                <a:hlinkClick r:id="rId4"/>
               </a:rPr>
               <a:t>www.cleancoders.com</a:t>
             </a:r>
@@ -49269,12 +49213,12 @@
           </a:p>
           <a:p>
             <a:r>
-              <a:rPr lang="en-US" i="1" dirty="0"/>
+              <a:rPr lang="en-US" b="1" i="1" dirty="0"/>
               <a:t>Refactoring Code</a:t>
             </a:r>
             <a:r>
               <a:rPr lang="en-US" dirty="0"/>
-              <a:t>, a book by Martin Fowler</a:t>
+              <a:t>, by Martin Fowler</a:t>
             </a:r>
           </a:p>
         </p:txBody>
@@ -50728,13 +50672,13 @@
   <p:clrMapOvr>
     <a:masterClrMapping/>
   </p:clrMapOvr>
-  <mc:AlternateContent xmlns:mc="http://schemas.openxmlformats.org/markup-compatibility/2006">
-    <mc:Choice xmlns:p14="http://schemas.microsoft.com/office/powerpoint/2010/main" Requires="p14">
+  <mc:AlternateContent xmlns:mc="http://schemas.openxmlformats.org/markup-compatibility/2006" xmlns:p14="http://schemas.microsoft.com/office/powerpoint/2010/main">
+    <mc:Choice Requires="p14">
       <p:transition spd="slow" p14:dur="900">
         <p14:warp dir="in"/>
       </p:transition>
     </mc:Choice>
-    <mc:Fallback>
+    <mc:Fallback xmlns="">
       <p:transition spd="slow">
         <p:fade/>
       </p:transition>
@@ -50806,13 +50750,13 @@
   <p:clrMapOvr>
     <a:masterClrMapping/>
   </p:clrMapOvr>
-  <mc:AlternateContent xmlns:mc="http://schemas.openxmlformats.org/markup-compatibility/2006">
-    <mc:Choice xmlns:p14="http://schemas.microsoft.com/office/powerpoint/2010/main" Requires="p14">
+  <mc:AlternateContent xmlns:mc="http://schemas.openxmlformats.org/markup-compatibility/2006" xmlns:p14="http://schemas.microsoft.com/office/powerpoint/2010/main">
+    <mc:Choice Requires="p14">
       <p:transition spd="slow" p14:dur="800">
         <p14:flythrough/>
       </p:transition>
     </mc:Choice>
-    <mc:Fallback>
+    <mc:Fallback xmlns="">
       <p:transition spd="slow">
         <p:fade/>
       </p:transition>

</xml_diff>